<commit_message>
fixed bug in powerpoint demo
</commit_message>
<xml_diff>
--- a/quickpbt.pptx
+++ b/quickpbt.pptx
@@ -10779,7 +10779,7 @@
           <a:p>
             <a:fld id="{792351EF-48F6-4A54-8506-ACD68070E42C}" type="datetimeFigureOut">
               <a:rPr lang="en-US" smtClean="0"/>
-              <a:t>2016-10-07</a:t>
+              <a:t>2016-10-08</a:t>
             </a:fld>
             <a:endParaRPr lang="en-US"/>
           </a:p>
@@ -11134,8 +11134,13 @@
             </a:r>
             <a:r>
               <a:rPr lang="en-US" baseline="0" dirty="0"/>
-              <a:t> as a professional developer</a:t>
-            </a:r>
+              <a:t> as a </a:t>
+            </a:r>
+            <a:r>
+              <a:rPr lang="en-US" baseline="0"/>
+              <a:t>professional developer</a:t>
+            </a:r>
+            <a:endParaRPr lang="en-US" baseline="0" dirty="0"/>
           </a:p>
           <a:p>
             <a:pPr marL="171450" indent="-171450">
@@ -11144,45 +11149,7 @@
             </a:pPr>
             <a:r>
               <a:rPr lang="en-US" baseline="0" dirty="0"/>
-              <a:t>Long-time Microsoft developer</a:t>
-            </a:r>
-          </a:p>
-          <a:p>
-            <a:pPr marL="628650" lvl="1" indent="-171450">
-              <a:buFont typeface="Arial" panose="020B0604020202020204" pitchFamily="34" charset="0"/>
-              <a:buChar char="•"/>
-            </a:pPr>
-            <a:r>
-              <a:rPr lang="en-US" baseline="0" dirty="0"/>
-              <a:t>.NET since it was in beta</a:t>
-            </a:r>
-          </a:p>
-          <a:p>
-            <a:pPr marL="628650" lvl="1" indent="-171450">
-              <a:buFont typeface="Arial" panose="020B0604020202020204" pitchFamily="34" charset="0"/>
-              <a:buChar char="•"/>
-            </a:pPr>
-            <a:r>
-              <a:rPr lang="en-US" baseline="0" dirty="0"/>
-              <a:t>Years of: C# &gt; VB &gt; </a:t>
-            </a:r>
-            <a:r>
-              <a:rPr lang="en-US" baseline="0" dirty="0" err="1"/>
-              <a:t>IronPython</a:t>
-            </a:r>
-            <a:r>
-              <a:rPr lang="en-US" baseline="0" dirty="0"/>
-              <a:t> &gt; F#</a:t>
-            </a:r>
-          </a:p>
-          <a:p>
-            <a:pPr marL="171450" lvl="0" indent="-171450">
-              <a:buFont typeface="Arial" panose="020B0604020202020204" pitchFamily="34" charset="0"/>
-              <a:buChar char="•"/>
-            </a:pPr>
-            <a:r>
-              <a:rPr lang="en-US" baseline="0" dirty="0"/>
-              <a:t>2014, 2015 Microsoft MVP (F#/.NET)</a:t>
+              <a:t>2014, 2015, 2016 Microsoft MVP (F#/.NET)</a:t>
             </a:r>
           </a:p>
           <a:p>
@@ -14888,7 +14855,7 @@
           <a:p>
             <a:fld id="{84FC9A44-31BA-473D-90EB-2B4B506A8774}" type="datetime1">
               <a:rPr lang="en-US" smtClean="0"/>
-              <a:t>2016-10-07</a:t>
+              <a:t>2016-10-08</a:t>
             </a:fld>
             <a:endParaRPr lang="en-US"/>
           </a:p>
@@ -15069,7 +15036,7 @@
           <a:p>
             <a:fld id="{A0D70A4E-4719-4060-8CE9-A64B77C1F437}" type="datetime1">
               <a:rPr lang="en-US" smtClean="0"/>
-              <a:t>2016-10-07</a:t>
+              <a:t>2016-10-08</a:t>
             </a:fld>
             <a:endParaRPr lang="en-US"/>
           </a:p>
@@ -15260,7 +15227,7 @@
           <a:p>
             <a:fld id="{CD5C1A23-DD78-40CC-87F0-AEA8F03DBC64}" type="datetime1">
               <a:rPr lang="en-US" smtClean="0"/>
-              <a:t>2016-10-07</a:t>
+              <a:t>2016-10-08</a:t>
             </a:fld>
             <a:endParaRPr lang="en-US"/>
           </a:p>
@@ -15441,7 +15408,7 @@
           <a:p>
             <a:fld id="{EA0DD099-93A6-4C54-8EFC-51F7179FF08A}" type="datetime1">
               <a:rPr lang="en-US" smtClean="0"/>
-              <a:t>2016-10-07</a:t>
+              <a:t>2016-10-08</a:t>
             </a:fld>
             <a:endParaRPr lang="en-US"/>
           </a:p>
@@ -15699,7 +15666,7 @@
           <a:p>
             <a:fld id="{438FA885-58E0-4914-AFB6-E1D2253F30DF}" type="datetime1">
               <a:rPr lang="en-US" smtClean="0"/>
-              <a:t>2016-10-07</a:t>
+              <a:t>2016-10-08</a:t>
             </a:fld>
             <a:endParaRPr lang="en-US"/>
           </a:p>
@@ -15941,7 +15908,7 @@
           <a:p>
             <a:fld id="{18C5AAED-6FC4-403F-BCA4-E28A6479AE8E}" type="datetime1">
               <a:rPr lang="en-US" smtClean="0"/>
-              <a:t>2016-10-07</a:t>
+              <a:t>2016-10-08</a:t>
             </a:fld>
             <a:endParaRPr lang="en-US"/>
           </a:p>
@@ -16318,7 +16285,7 @@
           <a:p>
             <a:fld id="{80941D23-49EA-47ED-92AB-DF4E801CDC3B}" type="datetime1">
               <a:rPr lang="en-US" smtClean="0"/>
-              <a:t>2016-10-07</a:t>
+              <a:t>2016-10-08</a:t>
             </a:fld>
             <a:endParaRPr lang="en-US"/>
           </a:p>
@@ -16448,7 +16415,7 @@
           <a:p>
             <a:fld id="{F8FB43DA-14DE-4464-89F5-BBC3D201E6FD}" type="datetime1">
               <a:rPr lang="en-US" smtClean="0"/>
-              <a:t>2016-10-07</a:t>
+              <a:t>2016-10-08</a:t>
             </a:fld>
             <a:endParaRPr lang="en-US"/>
           </a:p>
@@ -16556,7 +16523,7 @@
           <a:p>
             <a:fld id="{D127DAF6-8EB5-4C97-8010-ACFB1F63921D}" type="datetime1">
               <a:rPr lang="en-US" smtClean="0"/>
-              <a:t>2016-10-07</a:t>
+              <a:t>2016-10-08</a:t>
             </a:fld>
             <a:endParaRPr lang="en-US" dirty="0"/>
           </a:p>
@@ -16844,7 +16811,7 @@
           <a:p>
             <a:fld id="{42933535-5548-4F17-8697-4FDD620CAB2E}" type="datetime1">
               <a:rPr lang="en-US" smtClean="0"/>
-              <a:t>2016-10-07</a:t>
+              <a:t>2016-10-08</a:t>
             </a:fld>
             <a:endParaRPr lang="en-US"/>
           </a:p>
@@ -17109,7 +17076,7 @@
           <a:p>
             <a:fld id="{1CCE9BD6-450D-4862-9490-873171136554}" type="datetime1">
               <a:rPr lang="en-US" smtClean="0"/>
-              <a:t>2016-10-07</a:t>
+              <a:t>2016-10-08</a:t>
             </a:fld>
             <a:endParaRPr lang="en-US"/>
           </a:p>
@@ -27380,7 +27347,7 @@
             </a:r>
             <a:r>
               <a:rPr lang="en-US" sz="1200" dirty="0"/>
-              <a:t> 24</a:t>
+              <a:t> (7 * 24)</a:t>
             </a:r>
           </a:p>
           <a:p>
@@ -27608,7 +27575,7 @@
             </a:r>
             <a:r>
               <a:rPr lang="en-US" sz="1200" dirty="0"/>
-              <a:t> 24</a:t>
+              <a:t> (7 * 24)</a:t>
             </a:r>
           </a:p>
           <a:p>

</xml_diff>

<commit_message>
updated slide deck (statmuse); added pdf version of presentation
</commit_message>
<xml_diff>
--- a/quickpbt.pptx
+++ b/quickpbt.pptx
@@ -1159,15 +1159,15 @@
 </file>
 
 <file path=ppt/diagrams/colors1.xml><?xml version="1.0" encoding="utf-8"?>
-<dgm:colorsDef xmlns:dgm="http://schemas.openxmlformats.org/drawingml/2006/diagram" xmlns:a="http://schemas.openxmlformats.org/drawingml/2006/main" uniqueId="urn:microsoft.com/office/officeart/2005/8/colors/colorful4">
+<dgm:colorsDef xmlns:dgm="http://schemas.openxmlformats.org/drawingml/2006/diagram" xmlns:a="http://schemas.openxmlformats.org/drawingml/2006/main" uniqueId="urn:microsoft.com/office/officeart/2005/8/colors/colorful1">
   <dgm:title val=""/>
   <dgm:desc val=""/>
   <dgm:catLst>
-    <dgm:cat type="colorful" pri="10400"/>
+    <dgm:cat type="colorful" pri="10100"/>
   </dgm:catLst>
   <dgm:styleLbl name="node0">
     <dgm:fillClrLst meth="repeat">
-      <a:schemeClr val="accent3"/>
+      <a:schemeClr val="accent1"/>
     </dgm:fillClrLst>
     <dgm:linClrLst meth="repeat">
       <a:schemeClr val="lt1"/>
@@ -1178,9 +1178,12 @@
     <dgm:txEffectClrLst/>
   </dgm:styleLbl>
   <dgm:styleLbl name="node1">
-    <dgm:fillClrLst>
+    <dgm:fillClrLst meth="repeat">
+      <a:schemeClr val="accent2"/>
+      <a:schemeClr val="accent3"/>
       <a:schemeClr val="accent4"/>
       <a:schemeClr val="accent5"/>
+      <a:schemeClr val="accent6"/>
     </dgm:fillClrLst>
     <dgm:linClrLst meth="repeat">
       <a:schemeClr val="lt1"/>
@@ -1191,13 +1194,19 @@
     <dgm:txEffectClrLst/>
   </dgm:styleLbl>
   <dgm:styleLbl name="alignNode1">
-    <dgm:fillClrLst>
+    <dgm:fillClrLst meth="repeat">
+      <a:schemeClr val="accent2"/>
+      <a:schemeClr val="accent3"/>
       <a:schemeClr val="accent4"/>
       <a:schemeClr val="accent5"/>
+      <a:schemeClr val="accent6"/>
     </dgm:fillClrLst>
-    <dgm:linClrLst>
+    <dgm:linClrLst meth="repeat">
+      <a:schemeClr val="accent2"/>
+      <a:schemeClr val="accent3"/>
       <a:schemeClr val="accent4"/>
       <a:schemeClr val="accent5"/>
+      <a:schemeClr val="accent6"/>
     </dgm:linClrLst>
     <dgm:effectClrLst/>
     <dgm:txLinClrLst/>
@@ -1205,9 +1214,12 @@
     <dgm:txEffectClrLst/>
   </dgm:styleLbl>
   <dgm:styleLbl name="lnNode1">
-    <dgm:fillClrLst>
+    <dgm:fillClrLst meth="repeat">
+      <a:schemeClr val="accent2"/>
+      <a:schemeClr val="accent3"/>
       <a:schemeClr val="accent4"/>
       <a:schemeClr val="accent5"/>
+      <a:schemeClr val="accent6"/>
     </dgm:fillClrLst>
     <dgm:linClrLst meth="repeat">
       <a:schemeClr val="lt1"/>
@@ -1218,11 +1230,20 @@
     <dgm:txEffectClrLst/>
   </dgm:styleLbl>
   <dgm:styleLbl name="vennNode1">
-    <dgm:fillClrLst>
+    <dgm:fillClrLst meth="repeat">
+      <a:schemeClr val="accent2">
+        <a:alpha val="50000"/>
+      </a:schemeClr>
+      <a:schemeClr val="accent3">
+        <a:alpha val="50000"/>
+      </a:schemeClr>
       <a:schemeClr val="accent4">
         <a:alpha val="50000"/>
       </a:schemeClr>
       <a:schemeClr val="accent5">
+        <a:alpha val="50000"/>
+      </a:schemeClr>
+      <a:schemeClr val="accent6">
         <a:alpha val="50000"/>
       </a:schemeClr>
     </dgm:fillClrLst>
@@ -1236,7 +1257,7 @@
   </dgm:styleLbl>
   <dgm:styleLbl name="node2">
     <dgm:fillClrLst>
-      <a:schemeClr val="accent5"/>
+      <a:schemeClr val="accent2"/>
     </dgm:fillClrLst>
     <dgm:linClrLst meth="repeat">
       <a:schemeClr val="lt1"/>
@@ -1248,7 +1269,7 @@
   </dgm:styleLbl>
   <dgm:styleLbl name="node3">
     <dgm:fillClrLst>
-      <a:schemeClr val="accent6"/>
+      <a:schemeClr val="accent3"/>
     </dgm:fillClrLst>
     <dgm:linClrLst meth="repeat">
       <a:schemeClr val="lt1"/>
@@ -1260,7 +1281,7 @@
   </dgm:styleLbl>
   <dgm:styleLbl name="node4">
     <dgm:fillClrLst>
-      <a:schemeClr val="accent1"/>
+      <a:schemeClr val="accent4"/>
     </dgm:fillClrLst>
     <dgm:linClrLst meth="repeat">
       <a:schemeClr val="lt1"/>
@@ -1271,11 +1292,20 @@
     <dgm:txEffectClrLst/>
   </dgm:styleLbl>
   <dgm:styleLbl name="fgImgPlace1">
-    <dgm:fillClrLst>
+    <dgm:fillClrLst meth="repeat">
+      <a:schemeClr val="accent2">
+        <a:tint val="50000"/>
+      </a:schemeClr>
+      <a:schemeClr val="accent3">
+        <a:tint val="50000"/>
+      </a:schemeClr>
       <a:schemeClr val="accent4">
         <a:tint val="50000"/>
       </a:schemeClr>
       <a:schemeClr val="accent5">
+        <a:tint val="50000"/>
+      </a:schemeClr>
+      <a:schemeClr val="accent6">
         <a:tint val="50000"/>
       </a:schemeClr>
     </dgm:fillClrLst>
@@ -1291,10 +1321,10 @@
   </dgm:styleLbl>
   <dgm:styleLbl name="alignImgPlace1">
     <dgm:fillClrLst>
-      <a:schemeClr val="accent4">
+      <a:schemeClr val="accent1">
         <a:tint val="50000"/>
       </a:schemeClr>
-      <a:schemeClr val="accent5">
+      <a:schemeClr val="accent2">
         <a:tint val="20000"/>
       </a:schemeClr>
     </dgm:fillClrLst>
@@ -1310,10 +1340,10 @@
   </dgm:styleLbl>
   <dgm:styleLbl name="bgImgPlace1">
     <dgm:fillClrLst>
-      <a:schemeClr val="accent4">
+      <a:schemeClr val="accent1">
         <a:tint val="50000"/>
       </a:schemeClr>
-      <a:schemeClr val="accent5">
+      <a:schemeClr val="accent2">
         <a:tint val="20000"/>
       </a:schemeClr>
     </dgm:fillClrLst>
@@ -1328,11 +1358,14 @@
     <dgm:txEffectClrLst/>
   </dgm:styleLbl>
   <dgm:styleLbl name="sibTrans2D1">
-    <dgm:fillClrLst>
+    <dgm:fillClrLst meth="repeat">
+      <a:schemeClr val="accent2"/>
+      <a:schemeClr val="accent3"/>
       <a:schemeClr val="accent4"/>
       <a:schemeClr val="accent5"/>
+      <a:schemeClr val="accent6"/>
     </dgm:fillClrLst>
-    <dgm:linClrLst meth="repeat">
+    <dgm:linClrLst meth="cycle">
       <a:schemeClr val="lt1"/>
     </dgm:linClrLst>
     <dgm:effectClrLst/>
@@ -1341,11 +1374,14 @@
     <dgm:txEffectClrLst/>
   </dgm:styleLbl>
   <dgm:styleLbl name="fgSibTrans2D1">
-    <dgm:fillClrLst>
+    <dgm:fillClrLst meth="repeat">
+      <a:schemeClr val="accent2"/>
+      <a:schemeClr val="accent3"/>
       <a:schemeClr val="accent4"/>
       <a:schemeClr val="accent5"/>
+      <a:schemeClr val="accent6"/>
     </dgm:fillClrLst>
-    <dgm:linClrLst meth="repeat">
+    <dgm:linClrLst meth="cycle">
       <a:schemeClr val="lt1"/>
     </dgm:linClrLst>
     <dgm:effectClrLst/>
@@ -1356,11 +1392,14 @@
     <dgm:txEffectClrLst/>
   </dgm:styleLbl>
   <dgm:styleLbl name="bgSibTrans2D1">
-    <dgm:fillClrLst>
+    <dgm:fillClrLst meth="repeat">
+      <a:schemeClr val="accent2"/>
+      <a:schemeClr val="accent3"/>
       <a:schemeClr val="accent4"/>
       <a:schemeClr val="accent5"/>
+      <a:schemeClr val="accent6"/>
     </dgm:fillClrLst>
-    <dgm:linClrLst meth="repeat">
+    <dgm:linClrLst meth="cycle">
       <a:schemeClr val="lt1"/>
     </dgm:linClrLst>
     <dgm:effectClrLst/>
@@ -1371,10 +1410,19 @@
     <dgm:txEffectClrLst/>
   </dgm:styleLbl>
   <dgm:styleLbl name="sibTrans1D1">
-    <dgm:fillClrLst/>
-    <dgm:linClrLst>
+    <dgm:fillClrLst meth="repeat">
+      <a:schemeClr val="accent2"/>
+      <a:schemeClr val="accent3"/>
       <a:schemeClr val="accent4"/>
       <a:schemeClr val="accent5"/>
+      <a:schemeClr val="accent6"/>
+    </dgm:fillClrLst>
+    <dgm:linClrLst meth="repeat">
+      <a:schemeClr val="accent2"/>
+      <a:schemeClr val="accent3"/>
+      <a:schemeClr val="accent4"/>
+      <a:schemeClr val="accent5"/>
+      <a:schemeClr val="accent6"/>
     </dgm:linClrLst>
     <dgm:effectClrLst/>
     <dgm:txLinClrLst/>
@@ -1385,10 +1433,10 @@
   </dgm:styleLbl>
   <dgm:styleLbl name="callout">
     <dgm:fillClrLst meth="repeat">
-      <a:schemeClr val="accent4"/>
+      <a:schemeClr val="accent2"/>
     </dgm:fillClrLst>
     <dgm:linClrLst meth="repeat">
-      <a:schemeClr val="accent4">
+      <a:schemeClr val="accent2">
         <a:tint val="50000"/>
       </a:schemeClr>
     </dgm:linClrLst>
@@ -1401,12 +1449,10 @@
   </dgm:styleLbl>
   <dgm:styleLbl name="asst0">
     <dgm:fillClrLst meth="repeat">
-      <a:schemeClr val="accent4"/>
+      <a:schemeClr val="accent1"/>
     </dgm:fillClrLst>
     <dgm:linClrLst meth="repeat">
-      <a:schemeClr val="lt1">
-        <a:shade val="80000"/>
-      </a:schemeClr>
+      <a:schemeClr val="lt1"/>
     </dgm:linClrLst>
     <dgm:effectClrLst/>
     <dgm:txLinClrLst/>
@@ -1415,12 +1461,10 @@
   </dgm:styleLbl>
   <dgm:styleLbl name="asst1">
     <dgm:fillClrLst meth="repeat">
-      <a:schemeClr val="accent5"/>
+      <a:schemeClr val="accent2"/>
     </dgm:fillClrLst>
     <dgm:linClrLst meth="repeat">
-      <a:schemeClr val="lt1">
-        <a:shade val="80000"/>
-      </a:schemeClr>
+      <a:schemeClr val="lt1"/>
     </dgm:linClrLst>
     <dgm:effectClrLst/>
     <dgm:txLinClrLst/>
@@ -1429,7 +1473,7 @@
   </dgm:styleLbl>
   <dgm:styleLbl name="asst2">
     <dgm:fillClrLst>
-      <a:schemeClr val="accent6"/>
+      <a:schemeClr val="accent3"/>
     </dgm:fillClrLst>
     <dgm:linClrLst meth="repeat">
       <a:schemeClr val="lt1"/>
@@ -1441,7 +1485,7 @@
   </dgm:styleLbl>
   <dgm:styleLbl name="asst3">
     <dgm:fillClrLst>
-      <a:schemeClr val="accent1"/>
+      <a:schemeClr val="accent4"/>
     </dgm:fillClrLst>
     <dgm:linClrLst meth="repeat">
       <a:schemeClr val="lt1"/>
@@ -1453,7 +1497,7 @@
   </dgm:styleLbl>
   <dgm:styleLbl name="asst4">
     <dgm:fillClrLst>
-      <a:schemeClr val="accent2"/>
+      <a:schemeClr val="accent5"/>
     </dgm:fillClrLst>
     <dgm:linClrLst meth="repeat">
       <a:schemeClr val="lt1"/>
@@ -1465,7 +1509,7 @@
   </dgm:styleLbl>
   <dgm:styleLbl name="parChTrans2D1">
     <dgm:fillClrLst meth="repeat">
-      <a:schemeClr val="accent4"/>
+      <a:schemeClr val="accent2"/>
     </dgm:fillClrLst>
     <dgm:linClrLst meth="repeat">
       <a:schemeClr val="lt1"/>
@@ -1479,7 +1523,7 @@
   </dgm:styleLbl>
   <dgm:styleLbl name="parChTrans2D2">
     <dgm:fillClrLst meth="repeat">
-      <a:schemeClr val="accent5"/>
+      <a:schemeClr val="accent3"/>
     </dgm:fillClrLst>
     <dgm:linClrLst meth="repeat">
       <a:schemeClr val="lt1"/>
@@ -1491,7 +1535,7 @@
   </dgm:styleLbl>
   <dgm:styleLbl name="parChTrans2D3">
     <dgm:fillClrLst meth="repeat">
-      <a:schemeClr val="accent5"/>
+      <a:schemeClr val="accent4"/>
     </dgm:fillClrLst>
     <dgm:linClrLst meth="repeat">
       <a:schemeClr val="lt1"/>
@@ -1503,7 +1547,7 @@
   </dgm:styleLbl>
   <dgm:styleLbl name="parChTrans2D4">
     <dgm:fillClrLst meth="repeat">
-      <a:schemeClr val="accent6"/>
+      <a:schemeClr val="accent5"/>
     </dgm:fillClrLst>
     <dgm:linClrLst meth="repeat">
       <a:schemeClr val="lt1"/>
@@ -1517,10 +1561,10 @@
   </dgm:styleLbl>
   <dgm:styleLbl name="parChTrans1D1">
     <dgm:fillClrLst meth="repeat">
-      <a:schemeClr val="accent4"/>
+      <a:schemeClr val="accent2"/>
     </dgm:fillClrLst>
     <dgm:linClrLst meth="repeat">
-      <a:schemeClr val="accent4"/>
+      <a:schemeClr val="accent1"/>
     </dgm:linClrLst>
     <dgm:effectClrLst/>
     <dgm:txLinClrLst/>
@@ -1531,12 +1575,12 @@
   </dgm:styleLbl>
   <dgm:styleLbl name="parChTrans1D2">
     <dgm:fillClrLst meth="repeat">
-      <a:schemeClr val="accent4">
+      <a:schemeClr val="accent3">
         <a:tint val="90000"/>
       </a:schemeClr>
     </dgm:fillClrLst>
     <dgm:linClrLst meth="repeat">
-      <a:schemeClr val="accent5"/>
+      <a:schemeClr val="accent2"/>
     </dgm:linClrLst>
     <dgm:effectClrLst/>
     <dgm:txLinClrLst/>
@@ -1552,7 +1596,7 @@
       </a:schemeClr>
     </dgm:fillClrLst>
     <dgm:linClrLst meth="repeat">
-      <a:schemeClr val="accent6"/>
+      <a:schemeClr val="accent3"/>
     </dgm:linClrLst>
     <dgm:effectClrLst/>
     <dgm:txLinClrLst/>
@@ -1563,12 +1607,12 @@
   </dgm:styleLbl>
   <dgm:styleLbl name="parChTrans1D4">
     <dgm:fillClrLst meth="repeat">
-      <a:schemeClr val="accent4">
+      <a:schemeClr val="accent5">
         <a:tint val="50000"/>
       </a:schemeClr>
     </dgm:fillClrLst>
     <dgm:linClrLst meth="repeat">
-      <a:schemeClr val="accent1"/>
+      <a:schemeClr val="accent4"/>
     </dgm:linClrLst>
     <dgm:effectClrLst/>
     <dgm:txLinClrLst/>
@@ -1583,9 +1627,12 @@
         <a:alpha val="90000"/>
       </a:schemeClr>
     </dgm:fillClrLst>
-    <dgm:linClrLst>
+    <dgm:linClrLst meth="repeat">
+      <a:schemeClr val="accent2"/>
+      <a:schemeClr val="accent3"/>
       <a:schemeClr val="accent4"/>
       <a:schemeClr val="accent5"/>
+      <a:schemeClr val="accent6"/>
     </dgm:linClrLst>
     <dgm:effectClrLst/>
     <dgm:txLinClrLst/>
@@ -1600,9 +1647,12 @@
         <a:alpha val="90000"/>
       </a:schemeClr>
     </dgm:fillClrLst>
-    <dgm:linClrLst>
+    <dgm:linClrLst meth="repeat">
+      <a:schemeClr val="accent2"/>
+      <a:schemeClr val="accent3"/>
       <a:schemeClr val="accent4"/>
       <a:schemeClr val="accent5"/>
+      <a:schemeClr val="accent6"/>
     </dgm:linClrLst>
     <dgm:effectClrLst/>
     <dgm:txLinClrLst/>
@@ -1617,9 +1667,12 @@
         <a:alpha val="90000"/>
       </a:schemeClr>
     </dgm:fillClrLst>
-    <dgm:linClrLst>
+    <dgm:linClrLst meth="repeat">
+      <a:schemeClr val="accent2"/>
+      <a:schemeClr val="accent3"/>
       <a:schemeClr val="accent4"/>
       <a:schemeClr val="accent5"/>
+      <a:schemeClr val="accent6"/>
     </dgm:linClrLst>
     <dgm:effectClrLst/>
     <dgm:txLinClrLst/>
@@ -1635,7 +1688,7 @@
       </a:schemeClr>
     </dgm:fillClrLst>
     <dgm:linClrLst meth="repeat">
-      <a:schemeClr val="accent4"/>
+      <a:schemeClr val="accent1"/>
     </dgm:linClrLst>
     <dgm:effectClrLst/>
     <dgm:txLinClrLst/>
@@ -1650,9 +1703,12 @@
         <a:alpha val="90000"/>
       </a:schemeClr>
     </dgm:fillClrLst>
-    <dgm:linClrLst>
+    <dgm:linClrLst meth="repeat">
+      <a:schemeClr val="accent2"/>
+      <a:schemeClr val="accent3"/>
       <a:schemeClr val="accent4"/>
       <a:schemeClr val="accent5"/>
+      <a:schemeClr val="accent6"/>
     </dgm:linClrLst>
     <dgm:effectClrLst/>
     <dgm:txLinClrLst/>
@@ -1665,9 +1721,12 @@
     <dgm:fillClrLst meth="repeat">
       <a:schemeClr val="lt1"/>
     </dgm:fillClrLst>
-    <dgm:linClrLst>
+    <dgm:linClrLst meth="repeat">
+      <a:schemeClr val="accent2"/>
+      <a:schemeClr val="accent3"/>
       <a:schemeClr val="accent4"/>
       <a:schemeClr val="accent5"/>
+      <a:schemeClr val="accent6"/>
     </dgm:linClrLst>
     <dgm:effectClrLst/>
     <dgm:txLinClrLst/>
@@ -1680,9 +1739,12 @@
     <dgm:fillClrLst meth="repeat">
       <a:schemeClr val="lt1"/>
     </dgm:fillClrLst>
-    <dgm:linClrLst>
+    <dgm:linClrLst meth="repeat">
+      <a:schemeClr val="accent2"/>
+      <a:schemeClr val="accent3"/>
       <a:schemeClr val="accent4"/>
       <a:schemeClr val="accent5"/>
+      <a:schemeClr val="accent6"/>
     </dgm:linClrLst>
     <dgm:effectClrLst/>
     <dgm:txLinClrLst/>
@@ -1695,9 +1757,12 @@
     <dgm:fillClrLst meth="repeat">
       <a:schemeClr val="lt1"/>
     </dgm:fillClrLst>
-    <dgm:linClrLst>
+    <dgm:linClrLst meth="repeat">
+      <a:schemeClr val="accent2"/>
+      <a:schemeClr val="accent3"/>
       <a:schemeClr val="accent4"/>
       <a:schemeClr val="accent5"/>
+      <a:schemeClr val="accent6"/>
     </dgm:linClrLst>
     <dgm:effectClrLst/>
     <dgm:txLinClrLst/>
@@ -1707,7 +1772,15 @@
     <dgm:txEffectClrLst/>
   </dgm:styleLbl>
   <dgm:styleLbl name="fgAccFollowNode1">
-    <dgm:fillClrLst>
+    <dgm:fillClrLst meth="repeat">
+      <a:schemeClr val="accent2">
+        <a:tint val="40000"/>
+        <a:alpha val="90000"/>
+      </a:schemeClr>
+      <a:schemeClr val="accent3">
+        <a:tint val="40000"/>
+        <a:alpha val="90000"/>
+      </a:schemeClr>
       <a:schemeClr val="accent4">
         <a:tint val="40000"/>
         <a:alpha val="90000"/>
@@ -1716,13 +1789,29 @@
         <a:tint val="40000"/>
         <a:alpha val="90000"/>
       </a:schemeClr>
+      <a:schemeClr val="accent6">
+        <a:tint val="40000"/>
+        <a:alpha val="90000"/>
+      </a:schemeClr>
     </dgm:fillClrLst>
-    <dgm:linClrLst>
+    <dgm:linClrLst meth="repeat">
+      <a:schemeClr val="accent2">
+        <a:tint val="40000"/>
+        <a:alpha val="90000"/>
+      </a:schemeClr>
+      <a:schemeClr val="accent3">
+        <a:tint val="40000"/>
+        <a:alpha val="90000"/>
+      </a:schemeClr>
       <a:schemeClr val="accent4">
         <a:tint val="40000"/>
         <a:alpha val="90000"/>
       </a:schemeClr>
       <a:schemeClr val="accent5">
+        <a:tint val="40000"/>
+        <a:alpha val="90000"/>
+      </a:schemeClr>
+      <a:schemeClr val="accent6">
         <a:tint val="40000"/>
         <a:alpha val="90000"/>
       </a:schemeClr>
@@ -1735,7 +1824,15 @@
     <dgm:txEffectClrLst/>
   </dgm:styleLbl>
   <dgm:styleLbl name="alignAccFollowNode1">
-    <dgm:fillClrLst>
+    <dgm:fillClrLst meth="repeat">
+      <a:schemeClr val="accent2">
+        <a:tint val="40000"/>
+        <a:alpha val="90000"/>
+      </a:schemeClr>
+      <a:schemeClr val="accent3">
+        <a:tint val="40000"/>
+        <a:alpha val="90000"/>
+      </a:schemeClr>
       <a:schemeClr val="accent4">
         <a:tint val="40000"/>
         <a:alpha val="90000"/>
@@ -1744,13 +1841,29 @@
         <a:tint val="40000"/>
         <a:alpha val="90000"/>
       </a:schemeClr>
+      <a:schemeClr val="accent6">
+        <a:tint val="40000"/>
+        <a:alpha val="90000"/>
+      </a:schemeClr>
     </dgm:fillClrLst>
-    <dgm:linClrLst>
+    <dgm:linClrLst meth="repeat">
+      <a:schemeClr val="accent2">
+        <a:tint val="40000"/>
+        <a:alpha val="90000"/>
+      </a:schemeClr>
+      <a:schemeClr val="accent3">
+        <a:tint val="40000"/>
+        <a:alpha val="90000"/>
+      </a:schemeClr>
       <a:schemeClr val="accent4">
         <a:tint val="40000"/>
         <a:alpha val="90000"/>
       </a:schemeClr>
       <a:schemeClr val="accent5">
+        <a:tint val="40000"/>
+        <a:alpha val="90000"/>
+      </a:schemeClr>
+      <a:schemeClr val="accent6">
         <a:tint val="40000"/>
         <a:alpha val="90000"/>
       </a:schemeClr>
@@ -1763,7 +1876,15 @@
     <dgm:txEffectClrLst/>
   </dgm:styleLbl>
   <dgm:styleLbl name="bgAccFollowNode1">
-    <dgm:fillClrLst>
+    <dgm:fillClrLst meth="repeat">
+      <a:schemeClr val="accent2">
+        <a:tint val="40000"/>
+        <a:alpha val="90000"/>
+      </a:schemeClr>
+      <a:schemeClr val="accent3">
+        <a:tint val="40000"/>
+        <a:alpha val="90000"/>
+      </a:schemeClr>
       <a:schemeClr val="accent4">
         <a:tint val="40000"/>
         <a:alpha val="90000"/>
@@ -1772,13 +1893,29 @@
         <a:tint val="40000"/>
         <a:alpha val="90000"/>
       </a:schemeClr>
+      <a:schemeClr val="accent6">
+        <a:tint val="40000"/>
+        <a:alpha val="90000"/>
+      </a:schemeClr>
     </dgm:fillClrLst>
-    <dgm:linClrLst>
+    <dgm:linClrLst meth="repeat">
+      <a:schemeClr val="accent2">
+        <a:tint val="40000"/>
+        <a:alpha val="90000"/>
+      </a:schemeClr>
+      <a:schemeClr val="accent3">
+        <a:tint val="40000"/>
+        <a:alpha val="90000"/>
+      </a:schemeClr>
       <a:schemeClr val="accent4">
         <a:tint val="40000"/>
         <a:alpha val="90000"/>
       </a:schemeClr>
       <a:schemeClr val="accent5">
+        <a:tint val="40000"/>
+        <a:alpha val="90000"/>
+      </a:schemeClr>
+      <a:schemeClr val="accent6">
         <a:tint val="40000"/>
         <a:alpha val="90000"/>
       </a:schemeClr>
@@ -1797,7 +1934,7 @@
       </a:schemeClr>
     </dgm:fillClrLst>
     <dgm:linClrLst>
-      <a:schemeClr val="accent3"/>
+      <a:schemeClr val="accent1"/>
     </dgm:linClrLst>
     <dgm:effectClrLst/>
     <dgm:txLinClrLst/>
@@ -1813,7 +1950,7 @@
       </a:schemeClr>
     </dgm:fillClrLst>
     <dgm:linClrLst>
-      <a:schemeClr val="accent5"/>
+      <a:schemeClr val="accent2"/>
     </dgm:linClrLst>
     <dgm:effectClrLst/>
     <dgm:txLinClrLst/>
@@ -1829,7 +1966,7 @@
       </a:schemeClr>
     </dgm:fillClrLst>
     <dgm:linClrLst>
-      <a:schemeClr val="accent6"/>
+      <a:schemeClr val="accent3"/>
     </dgm:linClrLst>
     <dgm:effectClrLst/>
     <dgm:txLinClrLst/>
@@ -1845,7 +1982,7 @@
       </a:schemeClr>
     </dgm:fillClrLst>
     <dgm:linClrLst>
-      <a:schemeClr val="accent1"/>
+      <a:schemeClr val="accent4"/>
     </dgm:linClrLst>
     <dgm:effectClrLst/>
     <dgm:txLinClrLst/>
@@ -1856,7 +1993,7 @@
   </dgm:styleLbl>
   <dgm:styleLbl name="bgShp">
     <dgm:fillClrLst meth="repeat">
-      <a:schemeClr val="accent4">
+      <a:schemeClr val="accent2">
         <a:tint val="40000"/>
       </a:schemeClr>
     </dgm:fillClrLst>
@@ -1872,7 +2009,7 @@
   </dgm:styleLbl>
   <dgm:styleLbl name="dkBgShp">
     <dgm:fillClrLst meth="repeat">
-      <a:schemeClr val="accent4">
+      <a:schemeClr val="accent2">
         <a:shade val="90000"/>
       </a:schemeClr>
     </dgm:fillClrLst>
@@ -1888,13 +2025,13 @@
   </dgm:styleLbl>
   <dgm:styleLbl name="trBgShp">
     <dgm:fillClrLst meth="repeat">
-      <a:schemeClr val="accent4">
+      <a:schemeClr val="accent1">
         <a:tint val="50000"/>
         <a:alpha val="40000"/>
       </a:schemeClr>
     </dgm:fillClrLst>
     <dgm:linClrLst meth="repeat">
-      <a:schemeClr val="accent4"/>
+      <a:schemeClr val="accent2"/>
     </dgm:linClrLst>
     <dgm:effectClrLst/>
     <dgm:txLinClrLst/>
@@ -1905,7 +2042,7 @@
   </dgm:styleLbl>
   <dgm:styleLbl name="fgShp">
     <dgm:fillClrLst meth="repeat">
-      <a:schemeClr val="accent4">
+      <a:schemeClr val="accent2">
         <a:tint val="40000"/>
       </a:schemeClr>
     </dgm:fillClrLst>
@@ -1941,15 +2078,15 @@
 </file>
 
 <file path=ppt/diagrams/colors2.xml><?xml version="1.0" encoding="utf-8"?>
-<dgm:colorsDef xmlns:dgm="http://schemas.openxmlformats.org/drawingml/2006/diagram" xmlns:a="http://schemas.openxmlformats.org/drawingml/2006/main" uniqueId="urn:microsoft.com/office/officeart/2005/8/colors/colorful4">
+<dgm:colorsDef xmlns:dgm="http://schemas.openxmlformats.org/drawingml/2006/diagram" xmlns:a="http://schemas.openxmlformats.org/drawingml/2006/main" uniqueId="urn:microsoft.com/office/officeart/2005/8/colors/colorful1">
   <dgm:title val=""/>
   <dgm:desc val=""/>
   <dgm:catLst>
-    <dgm:cat type="colorful" pri="10400"/>
+    <dgm:cat type="colorful" pri="10100"/>
   </dgm:catLst>
   <dgm:styleLbl name="node0">
     <dgm:fillClrLst meth="repeat">
-      <a:schemeClr val="accent3"/>
+      <a:schemeClr val="accent1"/>
     </dgm:fillClrLst>
     <dgm:linClrLst meth="repeat">
       <a:schemeClr val="lt1"/>
@@ -1960,9 +2097,12 @@
     <dgm:txEffectClrLst/>
   </dgm:styleLbl>
   <dgm:styleLbl name="node1">
-    <dgm:fillClrLst>
+    <dgm:fillClrLst meth="repeat">
+      <a:schemeClr val="accent2"/>
+      <a:schemeClr val="accent3"/>
       <a:schemeClr val="accent4"/>
       <a:schemeClr val="accent5"/>
+      <a:schemeClr val="accent6"/>
     </dgm:fillClrLst>
     <dgm:linClrLst meth="repeat">
       <a:schemeClr val="lt1"/>
@@ -1973,13 +2113,19 @@
     <dgm:txEffectClrLst/>
   </dgm:styleLbl>
   <dgm:styleLbl name="alignNode1">
-    <dgm:fillClrLst>
+    <dgm:fillClrLst meth="repeat">
+      <a:schemeClr val="accent2"/>
+      <a:schemeClr val="accent3"/>
       <a:schemeClr val="accent4"/>
       <a:schemeClr val="accent5"/>
+      <a:schemeClr val="accent6"/>
     </dgm:fillClrLst>
-    <dgm:linClrLst>
+    <dgm:linClrLst meth="repeat">
+      <a:schemeClr val="accent2"/>
+      <a:schemeClr val="accent3"/>
       <a:schemeClr val="accent4"/>
       <a:schemeClr val="accent5"/>
+      <a:schemeClr val="accent6"/>
     </dgm:linClrLst>
     <dgm:effectClrLst/>
     <dgm:txLinClrLst/>
@@ -1987,9 +2133,12 @@
     <dgm:txEffectClrLst/>
   </dgm:styleLbl>
   <dgm:styleLbl name="lnNode1">
-    <dgm:fillClrLst>
+    <dgm:fillClrLst meth="repeat">
+      <a:schemeClr val="accent2"/>
+      <a:schemeClr val="accent3"/>
       <a:schemeClr val="accent4"/>
       <a:schemeClr val="accent5"/>
+      <a:schemeClr val="accent6"/>
     </dgm:fillClrLst>
     <dgm:linClrLst meth="repeat">
       <a:schemeClr val="lt1"/>
@@ -2000,11 +2149,20 @@
     <dgm:txEffectClrLst/>
   </dgm:styleLbl>
   <dgm:styleLbl name="vennNode1">
-    <dgm:fillClrLst>
+    <dgm:fillClrLst meth="repeat">
+      <a:schemeClr val="accent2">
+        <a:alpha val="50000"/>
+      </a:schemeClr>
+      <a:schemeClr val="accent3">
+        <a:alpha val="50000"/>
+      </a:schemeClr>
       <a:schemeClr val="accent4">
         <a:alpha val="50000"/>
       </a:schemeClr>
       <a:schemeClr val="accent5">
+        <a:alpha val="50000"/>
+      </a:schemeClr>
+      <a:schemeClr val="accent6">
         <a:alpha val="50000"/>
       </a:schemeClr>
     </dgm:fillClrLst>
@@ -2018,7 +2176,7 @@
   </dgm:styleLbl>
   <dgm:styleLbl name="node2">
     <dgm:fillClrLst>
-      <a:schemeClr val="accent5"/>
+      <a:schemeClr val="accent2"/>
     </dgm:fillClrLst>
     <dgm:linClrLst meth="repeat">
       <a:schemeClr val="lt1"/>
@@ -2030,7 +2188,7 @@
   </dgm:styleLbl>
   <dgm:styleLbl name="node3">
     <dgm:fillClrLst>
-      <a:schemeClr val="accent6"/>
+      <a:schemeClr val="accent3"/>
     </dgm:fillClrLst>
     <dgm:linClrLst meth="repeat">
       <a:schemeClr val="lt1"/>
@@ -2042,7 +2200,7 @@
   </dgm:styleLbl>
   <dgm:styleLbl name="node4">
     <dgm:fillClrLst>
-      <a:schemeClr val="accent1"/>
+      <a:schemeClr val="accent4"/>
     </dgm:fillClrLst>
     <dgm:linClrLst meth="repeat">
       <a:schemeClr val="lt1"/>
@@ -2053,11 +2211,20 @@
     <dgm:txEffectClrLst/>
   </dgm:styleLbl>
   <dgm:styleLbl name="fgImgPlace1">
-    <dgm:fillClrLst>
+    <dgm:fillClrLst meth="repeat">
+      <a:schemeClr val="accent2">
+        <a:tint val="50000"/>
+      </a:schemeClr>
+      <a:schemeClr val="accent3">
+        <a:tint val="50000"/>
+      </a:schemeClr>
       <a:schemeClr val="accent4">
         <a:tint val="50000"/>
       </a:schemeClr>
       <a:schemeClr val="accent5">
+        <a:tint val="50000"/>
+      </a:schemeClr>
+      <a:schemeClr val="accent6">
         <a:tint val="50000"/>
       </a:schemeClr>
     </dgm:fillClrLst>
@@ -2073,10 +2240,10 @@
   </dgm:styleLbl>
   <dgm:styleLbl name="alignImgPlace1">
     <dgm:fillClrLst>
-      <a:schemeClr val="accent4">
+      <a:schemeClr val="accent1">
         <a:tint val="50000"/>
       </a:schemeClr>
-      <a:schemeClr val="accent5">
+      <a:schemeClr val="accent2">
         <a:tint val="20000"/>
       </a:schemeClr>
     </dgm:fillClrLst>
@@ -2092,10 +2259,10 @@
   </dgm:styleLbl>
   <dgm:styleLbl name="bgImgPlace1">
     <dgm:fillClrLst>
-      <a:schemeClr val="accent4">
+      <a:schemeClr val="accent1">
         <a:tint val="50000"/>
       </a:schemeClr>
-      <a:schemeClr val="accent5">
+      <a:schemeClr val="accent2">
         <a:tint val="20000"/>
       </a:schemeClr>
     </dgm:fillClrLst>
@@ -2110,11 +2277,14 @@
     <dgm:txEffectClrLst/>
   </dgm:styleLbl>
   <dgm:styleLbl name="sibTrans2D1">
-    <dgm:fillClrLst>
+    <dgm:fillClrLst meth="repeat">
+      <a:schemeClr val="accent2"/>
+      <a:schemeClr val="accent3"/>
       <a:schemeClr val="accent4"/>
       <a:schemeClr val="accent5"/>
+      <a:schemeClr val="accent6"/>
     </dgm:fillClrLst>
-    <dgm:linClrLst meth="repeat">
+    <dgm:linClrLst meth="cycle">
       <a:schemeClr val="lt1"/>
     </dgm:linClrLst>
     <dgm:effectClrLst/>
@@ -2123,11 +2293,14 @@
     <dgm:txEffectClrLst/>
   </dgm:styleLbl>
   <dgm:styleLbl name="fgSibTrans2D1">
-    <dgm:fillClrLst>
+    <dgm:fillClrLst meth="repeat">
+      <a:schemeClr val="accent2"/>
+      <a:schemeClr val="accent3"/>
       <a:schemeClr val="accent4"/>
       <a:schemeClr val="accent5"/>
+      <a:schemeClr val="accent6"/>
     </dgm:fillClrLst>
-    <dgm:linClrLst meth="repeat">
+    <dgm:linClrLst meth="cycle">
       <a:schemeClr val="lt1"/>
     </dgm:linClrLst>
     <dgm:effectClrLst/>
@@ -2138,11 +2311,14 @@
     <dgm:txEffectClrLst/>
   </dgm:styleLbl>
   <dgm:styleLbl name="bgSibTrans2D1">
-    <dgm:fillClrLst>
+    <dgm:fillClrLst meth="repeat">
+      <a:schemeClr val="accent2"/>
+      <a:schemeClr val="accent3"/>
       <a:schemeClr val="accent4"/>
       <a:schemeClr val="accent5"/>
+      <a:schemeClr val="accent6"/>
     </dgm:fillClrLst>
-    <dgm:linClrLst meth="repeat">
+    <dgm:linClrLst meth="cycle">
       <a:schemeClr val="lt1"/>
     </dgm:linClrLst>
     <dgm:effectClrLst/>
@@ -2153,10 +2329,19 @@
     <dgm:txEffectClrLst/>
   </dgm:styleLbl>
   <dgm:styleLbl name="sibTrans1D1">
-    <dgm:fillClrLst/>
-    <dgm:linClrLst>
+    <dgm:fillClrLst meth="repeat">
+      <a:schemeClr val="accent2"/>
+      <a:schemeClr val="accent3"/>
       <a:schemeClr val="accent4"/>
       <a:schemeClr val="accent5"/>
+      <a:schemeClr val="accent6"/>
+    </dgm:fillClrLst>
+    <dgm:linClrLst meth="repeat">
+      <a:schemeClr val="accent2"/>
+      <a:schemeClr val="accent3"/>
+      <a:schemeClr val="accent4"/>
+      <a:schemeClr val="accent5"/>
+      <a:schemeClr val="accent6"/>
     </dgm:linClrLst>
     <dgm:effectClrLst/>
     <dgm:txLinClrLst/>
@@ -2167,10 +2352,10 @@
   </dgm:styleLbl>
   <dgm:styleLbl name="callout">
     <dgm:fillClrLst meth="repeat">
-      <a:schemeClr val="accent4"/>
+      <a:schemeClr val="accent2"/>
     </dgm:fillClrLst>
     <dgm:linClrLst meth="repeat">
-      <a:schemeClr val="accent4">
+      <a:schemeClr val="accent2">
         <a:tint val="50000"/>
       </a:schemeClr>
     </dgm:linClrLst>
@@ -2183,12 +2368,10 @@
   </dgm:styleLbl>
   <dgm:styleLbl name="asst0">
     <dgm:fillClrLst meth="repeat">
-      <a:schemeClr val="accent4"/>
+      <a:schemeClr val="accent1"/>
     </dgm:fillClrLst>
     <dgm:linClrLst meth="repeat">
-      <a:schemeClr val="lt1">
-        <a:shade val="80000"/>
-      </a:schemeClr>
+      <a:schemeClr val="lt1"/>
     </dgm:linClrLst>
     <dgm:effectClrLst/>
     <dgm:txLinClrLst/>
@@ -2197,12 +2380,10 @@
   </dgm:styleLbl>
   <dgm:styleLbl name="asst1">
     <dgm:fillClrLst meth="repeat">
-      <a:schemeClr val="accent5"/>
+      <a:schemeClr val="accent2"/>
     </dgm:fillClrLst>
     <dgm:linClrLst meth="repeat">
-      <a:schemeClr val="lt1">
-        <a:shade val="80000"/>
-      </a:schemeClr>
+      <a:schemeClr val="lt1"/>
     </dgm:linClrLst>
     <dgm:effectClrLst/>
     <dgm:txLinClrLst/>
@@ -2211,7 +2392,7 @@
   </dgm:styleLbl>
   <dgm:styleLbl name="asst2">
     <dgm:fillClrLst>
-      <a:schemeClr val="accent6"/>
+      <a:schemeClr val="accent3"/>
     </dgm:fillClrLst>
     <dgm:linClrLst meth="repeat">
       <a:schemeClr val="lt1"/>
@@ -2223,7 +2404,7 @@
   </dgm:styleLbl>
   <dgm:styleLbl name="asst3">
     <dgm:fillClrLst>
-      <a:schemeClr val="accent1"/>
+      <a:schemeClr val="accent4"/>
     </dgm:fillClrLst>
     <dgm:linClrLst meth="repeat">
       <a:schemeClr val="lt1"/>
@@ -2235,7 +2416,7 @@
   </dgm:styleLbl>
   <dgm:styleLbl name="asst4">
     <dgm:fillClrLst>
-      <a:schemeClr val="accent2"/>
+      <a:schemeClr val="accent5"/>
     </dgm:fillClrLst>
     <dgm:linClrLst meth="repeat">
       <a:schemeClr val="lt1"/>
@@ -2247,7 +2428,7 @@
   </dgm:styleLbl>
   <dgm:styleLbl name="parChTrans2D1">
     <dgm:fillClrLst meth="repeat">
-      <a:schemeClr val="accent4"/>
+      <a:schemeClr val="accent2"/>
     </dgm:fillClrLst>
     <dgm:linClrLst meth="repeat">
       <a:schemeClr val="lt1"/>
@@ -2261,7 +2442,7 @@
   </dgm:styleLbl>
   <dgm:styleLbl name="parChTrans2D2">
     <dgm:fillClrLst meth="repeat">
-      <a:schemeClr val="accent5"/>
+      <a:schemeClr val="accent3"/>
     </dgm:fillClrLst>
     <dgm:linClrLst meth="repeat">
       <a:schemeClr val="lt1"/>
@@ -2273,7 +2454,7 @@
   </dgm:styleLbl>
   <dgm:styleLbl name="parChTrans2D3">
     <dgm:fillClrLst meth="repeat">
-      <a:schemeClr val="accent5"/>
+      <a:schemeClr val="accent4"/>
     </dgm:fillClrLst>
     <dgm:linClrLst meth="repeat">
       <a:schemeClr val="lt1"/>
@@ -2285,7 +2466,7 @@
   </dgm:styleLbl>
   <dgm:styleLbl name="parChTrans2D4">
     <dgm:fillClrLst meth="repeat">
-      <a:schemeClr val="accent6"/>
+      <a:schemeClr val="accent5"/>
     </dgm:fillClrLst>
     <dgm:linClrLst meth="repeat">
       <a:schemeClr val="lt1"/>
@@ -2299,10 +2480,10 @@
   </dgm:styleLbl>
   <dgm:styleLbl name="parChTrans1D1">
     <dgm:fillClrLst meth="repeat">
-      <a:schemeClr val="accent4"/>
+      <a:schemeClr val="accent2"/>
     </dgm:fillClrLst>
     <dgm:linClrLst meth="repeat">
-      <a:schemeClr val="accent4"/>
+      <a:schemeClr val="accent1"/>
     </dgm:linClrLst>
     <dgm:effectClrLst/>
     <dgm:txLinClrLst/>
@@ -2313,12 +2494,12 @@
   </dgm:styleLbl>
   <dgm:styleLbl name="parChTrans1D2">
     <dgm:fillClrLst meth="repeat">
-      <a:schemeClr val="accent4">
+      <a:schemeClr val="accent3">
         <a:tint val="90000"/>
       </a:schemeClr>
     </dgm:fillClrLst>
     <dgm:linClrLst meth="repeat">
-      <a:schemeClr val="accent5"/>
+      <a:schemeClr val="accent2"/>
     </dgm:linClrLst>
     <dgm:effectClrLst/>
     <dgm:txLinClrLst/>
@@ -2334,7 +2515,7 @@
       </a:schemeClr>
     </dgm:fillClrLst>
     <dgm:linClrLst meth="repeat">
-      <a:schemeClr val="accent6"/>
+      <a:schemeClr val="accent3"/>
     </dgm:linClrLst>
     <dgm:effectClrLst/>
     <dgm:txLinClrLst/>
@@ -2345,12 +2526,12 @@
   </dgm:styleLbl>
   <dgm:styleLbl name="parChTrans1D4">
     <dgm:fillClrLst meth="repeat">
-      <a:schemeClr val="accent4">
+      <a:schemeClr val="accent5">
         <a:tint val="50000"/>
       </a:schemeClr>
     </dgm:fillClrLst>
     <dgm:linClrLst meth="repeat">
-      <a:schemeClr val="accent1"/>
+      <a:schemeClr val="accent4"/>
     </dgm:linClrLst>
     <dgm:effectClrLst/>
     <dgm:txLinClrLst/>
@@ -2365,9 +2546,12 @@
         <a:alpha val="90000"/>
       </a:schemeClr>
     </dgm:fillClrLst>
-    <dgm:linClrLst>
+    <dgm:linClrLst meth="repeat">
+      <a:schemeClr val="accent2"/>
+      <a:schemeClr val="accent3"/>
       <a:schemeClr val="accent4"/>
       <a:schemeClr val="accent5"/>
+      <a:schemeClr val="accent6"/>
     </dgm:linClrLst>
     <dgm:effectClrLst/>
     <dgm:txLinClrLst/>
@@ -2382,9 +2566,12 @@
         <a:alpha val="90000"/>
       </a:schemeClr>
     </dgm:fillClrLst>
-    <dgm:linClrLst>
+    <dgm:linClrLst meth="repeat">
+      <a:schemeClr val="accent2"/>
+      <a:schemeClr val="accent3"/>
       <a:schemeClr val="accent4"/>
       <a:schemeClr val="accent5"/>
+      <a:schemeClr val="accent6"/>
     </dgm:linClrLst>
     <dgm:effectClrLst/>
     <dgm:txLinClrLst/>
@@ -2399,9 +2586,12 @@
         <a:alpha val="90000"/>
       </a:schemeClr>
     </dgm:fillClrLst>
-    <dgm:linClrLst>
+    <dgm:linClrLst meth="repeat">
+      <a:schemeClr val="accent2"/>
+      <a:schemeClr val="accent3"/>
       <a:schemeClr val="accent4"/>
       <a:schemeClr val="accent5"/>
+      <a:schemeClr val="accent6"/>
     </dgm:linClrLst>
     <dgm:effectClrLst/>
     <dgm:txLinClrLst/>
@@ -2417,7 +2607,7 @@
       </a:schemeClr>
     </dgm:fillClrLst>
     <dgm:linClrLst meth="repeat">
-      <a:schemeClr val="accent4"/>
+      <a:schemeClr val="accent1"/>
     </dgm:linClrLst>
     <dgm:effectClrLst/>
     <dgm:txLinClrLst/>
@@ -2432,9 +2622,12 @@
         <a:alpha val="90000"/>
       </a:schemeClr>
     </dgm:fillClrLst>
-    <dgm:linClrLst>
+    <dgm:linClrLst meth="repeat">
+      <a:schemeClr val="accent2"/>
+      <a:schemeClr val="accent3"/>
       <a:schemeClr val="accent4"/>
       <a:schemeClr val="accent5"/>
+      <a:schemeClr val="accent6"/>
     </dgm:linClrLst>
     <dgm:effectClrLst/>
     <dgm:txLinClrLst/>
@@ -2447,9 +2640,12 @@
     <dgm:fillClrLst meth="repeat">
       <a:schemeClr val="lt1"/>
     </dgm:fillClrLst>
-    <dgm:linClrLst>
+    <dgm:linClrLst meth="repeat">
+      <a:schemeClr val="accent2"/>
+      <a:schemeClr val="accent3"/>
       <a:schemeClr val="accent4"/>
       <a:schemeClr val="accent5"/>
+      <a:schemeClr val="accent6"/>
     </dgm:linClrLst>
     <dgm:effectClrLst/>
     <dgm:txLinClrLst/>
@@ -2462,9 +2658,12 @@
     <dgm:fillClrLst meth="repeat">
       <a:schemeClr val="lt1"/>
     </dgm:fillClrLst>
-    <dgm:linClrLst>
+    <dgm:linClrLst meth="repeat">
+      <a:schemeClr val="accent2"/>
+      <a:schemeClr val="accent3"/>
       <a:schemeClr val="accent4"/>
       <a:schemeClr val="accent5"/>
+      <a:schemeClr val="accent6"/>
     </dgm:linClrLst>
     <dgm:effectClrLst/>
     <dgm:txLinClrLst/>
@@ -2477,9 +2676,12 @@
     <dgm:fillClrLst meth="repeat">
       <a:schemeClr val="lt1"/>
     </dgm:fillClrLst>
-    <dgm:linClrLst>
+    <dgm:linClrLst meth="repeat">
+      <a:schemeClr val="accent2"/>
+      <a:schemeClr val="accent3"/>
       <a:schemeClr val="accent4"/>
       <a:schemeClr val="accent5"/>
+      <a:schemeClr val="accent6"/>
     </dgm:linClrLst>
     <dgm:effectClrLst/>
     <dgm:txLinClrLst/>
@@ -2489,7 +2691,15 @@
     <dgm:txEffectClrLst/>
   </dgm:styleLbl>
   <dgm:styleLbl name="fgAccFollowNode1">
-    <dgm:fillClrLst>
+    <dgm:fillClrLst meth="repeat">
+      <a:schemeClr val="accent2">
+        <a:tint val="40000"/>
+        <a:alpha val="90000"/>
+      </a:schemeClr>
+      <a:schemeClr val="accent3">
+        <a:tint val="40000"/>
+        <a:alpha val="90000"/>
+      </a:schemeClr>
       <a:schemeClr val="accent4">
         <a:tint val="40000"/>
         <a:alpha val="90000"/>
@@ -2498,13 +2708,29 @@
         <a:tint val="40000"/>
         <a:alpha val="90000"/>
       </a:schemeClr>
+      <a:schemeClr val="accent6">
+        <a:tint val="40000"/>
+        <a:alpha val="90000"/>
+      </a:schemeClr>
     </dgm:fillClrLst>
-    <dgm:linClrLst>
+    <dgm:linClrLst meth="repeat">
+      <a:schemeClr val="accent2">
+        <a:tint val="40000"/>
+        <a:alpha val="90000"/>
+      </a:schemeClr>
+      <a:schemeClr val="accent3">
+        <a:tint val="40000"/>
+        <a:alpha val="90000"/>
+      </a:schemeClr>
       <a:schemeClr val="accent4">
         <a:tint val="40000"/>
         <a:alpha val="90000"/>
       </a:schemeClr>
       <a:schemeClr val="accent5">
+        <a:tint val="40000"/>
+        <a:alpha val="90000"/>
+      </a:schemeClr>
+      <a:schemeClr val="accent6">
         <a:tint val="40000"/>
         <a:alpha val="90000"/>
       </a:schemeClr>
@@ -2517,7 +2743,15 @@
     <dgm:txEffectClrLst/>
   </dgm:styleLbl>
   <dgm:styleLbl name="alignAccFollowNode1">
-    <dgm:fillClrLst>
+    <dgm:fillClrLst meth="repeat">
+      <a:schemeClr val="accent2">
+        <a:tint val="40000"/>
+        <a:alpha val="90000"/>
+      </a:schemeClr>
+      <a:schemeClr val="accent3">
+        <a:tint val="40000"/>
+        <a:alpha val="90000"/>
+      </a:schemeClr>
       <a:schemeClr val="accent4">
         <a:tint val="40000"/>
         <a:alpha val="90000"/>
@@ -2526,13 +2760,29 @@
         <a:tint val="40000"/>
         <a:alpha val="90000"/>
       </a:schemeClr>
+      <a:schemeClr val="accent6">
+        <a:tint val="40000"/>
+        <a:alpha val="90000"/>
+      </a:schemeClr>
     </dgm:fillClrLst>
-    <dgm:linClrLst>
+    <dgm:linClrLst meth="repeat">
+      <a:schemeClr val="accent2">
+        <a:tint val="40000"/>
+        <a:alpha val="90000"/>
+      </a:schemeClr>
+      <a:schemeClr val="accent3">
+        <a:tint val="40000"/>
+        <a:alpha val="90000"/>
+      </a:schemeClr>
       <a:schemeClr val="accent4">
         <a:tint val="40000"/>
         <a:alpha val="90000"/>
       </a:schemeClr>
       <a:schemeClr val="accent5">
+        <a:tint val="40000"/>
+        <a:alpha val="90000"/>
+      </a:schemeClr>
+      <a:schemeClr val="accent6">
         <a:tint val="40000"/>
         <a:alpha val="90000"/>
       </a:schemeClr>
@@ -2545,7 +2795,15 @@
     <dgm:txEffectClrLst/>
   </dgm:styleLbl>
   <dgm:styleLbl name="bgAccFollowNode1">
-    <dgm:fillClrLst>
+    <dgm:fillClrLst meth="repeat">
+      <a:schemeClr val="accent2">
+        <a:tint val="40000"/>
+        <a:alpha val="90000"/>
+      </a:schemeClr>
+      <a:schemeClr val="accent3">
+        <a:tint val="40000"/>
+        <a:alpha val="90000"/>
+      </a:schemeClr>
       <a:schemeClr val="accent4">
         <a:tint val="40000"/>
         <a:alpha val="90000"/>
@@ -2554,13 +2812,29 @@
         <a:tint val="40000"/>
         <a:alpha val="90000"/>
       </a:schemeClr>
+      <a:schemeClr val="accent6">
+        <a:tint val="40000"/>
+        <a:alpha val="90000"/>
+      </a:schemeClr>
     </dgm:fillClrLst>
-    <dgm:linClrLst>
+    <dgm:linClrLst meth="repeat">
+      <a:schemeClr val="accent2">
+        <a:tint val="40000"/>
+        <a:alpha val="90000"/>
+      </a:schemeClr>
+      <a:schemeClr val="accent3">
+        <a:tint val="40000"/>
+        <a:alpha val="90000"/>
+      </a:schemeClr>
       <a:schemeClr val="accent4">
         <a:tint val="40000"/>
         <a:alpha val="90000"/>
       </a:schemeClr>
       <a:schemeClr val="accent5">
+        <a:tint val="40000"/>
+        <a:alpha val="90000"/>
+      </a:schemeClr>
+      <a:schemeClr val="accent6">
         <a:tint val="40000"/>
         <a:alpha val="90000"/>
       </a:schemeClr>
@@ -2579,7 +2853,7 @@
       </a:schemeClr>
     </dgm:fillClrLst>
     <dgm:linClrLst>
-      <a:schemeClr val="accent3"/>
+      <a:schemeClr val="accent1"/>
     </dgm:linClrLst>
     <dgm:effectClrLst/>
     <dgm:txLinClrLst/>
@@ -2595,7 +2869,7 @@
       </a:schemeClr>
     </dgm:fillClrLst>
     <dgm:linClrLst>
-      <a:schemeClr val="accent5"/>
+      <a:schemeClr val="accent2"/>
     </dgm:linClrLst>
     <dgm:effectClrLst/>
     <dgm:txLinClrLst/>
@@ -2611,7 +2885,7 @@
       </a:schemeClr>
     </dgm:fillClrLst>
     <dgm:linClrLst>
-      <a:schemeClr val="accent6"/>
+      <a:schemeClr val="accent3"/>
     </dgm:linClrLst>
     <dgm:effectClrLst/>
     <dgm:txLinClrLst/>
@@ -2627,7 +2901,7 @@
       </a:schemeClr>
     </dgm:fillClrLst>
     <dgm:linClrLst>
-      <a:schemeClr val="accent1"/>
+      <a:schemeClr val="accent4"/>
     </dgm:linClrLst>
     <dgm:effectClrLst/>
     <dgm:txLinClrLst/>
@@ -2638,7 +2912,7 @@
   </dgm:styleLbl>
   <dgm:styleLbl name="bgShp">
     <dgm:fillClrLst meth="repeat">
-      <a:schemeClr val="accent4">
+      <a:schemeClr val="accent2">
         <a:tint val="40000"/>
       </a:schemeClr>
     </dgm:fillClrLst>
@@ -2654,7 +2928,7 @@
   </dgm:styleLbl>
   <dgm:styleLbl name="dkBgShp">
     <dgm:fillClrLst meth="repeat">
-      <a:schemeClr val="accent4">
+      <a:schemeClr val="accent2">
         <a:shade val="90000"/>
       </a:schemeClr>
     </dgm:fillClrLst>
@@ -2670,13 +2944,13 @@
   </dgm:styleLbl>
   <dgm:styleLbl name="trBgShp">
     <dgm:fillClrLst meth="repeat">
-      <a:schemeClr val="accent4">
+      <a:schemeClr val="accent1">
         <a:tint val="50000"/>
         <a:alpha val="40000"/>
       </a:schemeClr>
     </dgm:fillClrLst>
     <dgm:linClrLst meth="repeat">
-      <a:schemeClr val="accent4"/>
+      <a:schemeClr val="accent2"/>
     </dgm:linClrLst>
     <dgm:effectClrLst/>
     <dgm:txLinClrLst/>
@@ -2687,7 +2961,7 @@
   </dgm:styleLbl>
   <dgm:styleLbl name="fgShp">
     <dgm:fillClrLst meth="repeat">
-      <a:schemeClr val="accent4">
+      <a:schemeClr val="accent2">
         <a:tint val="40000"/>
       </a:schemeClr>
     </dgm:fillClrLst>
@@ -2723,15 +2997,15 @@
 </file>
 
 <file path=ppt/diagrams/colors3.xml><?xml version="1.0" encoding="utf-8"?>
-<dgm:colorsDef xmlns:dgm="http://schemas.openxmlformats.org/drawingml/2006/diagram" xmlns:a="http://schemas.openxmlformats.org/drawingml/2006/main" uniqueId="urn:microsoft.com/office/officeart/2005/8/colors/colorful4">
+<dgm:colorsDef xmlns:dgm="http://schemas.openxmlformats.org/drawingml/2006/diagram" xmlns:a="http://schemas.openxmlformats.org/drawingml/2006/main" uniqueId="urn:microsoft.com/office/officeart/2005/8/colors/colorful1">
   <dgm:title val=""/>
   <dgm:desc val=""/>
   <dgm:catLst>
-    <dgm:cat type="colorful" pri="10400"/>
+    <dgm:cat type="colorful" pri="10100"/>
   </dgm:catLst>
   <dgm:styleLbl name="node0">
     <dgm:fillClrLst meth="repeat">
-      <a:schemeClr val="accent3"/>
+      <a:schemeClr val="accent1"/>
     </dgm:fillClrLst>
     <dgm:linClrLst meth="repeat">
       <a:schemeClr val="lt1"/>
@@ -2742,9 +3016,12 @@
     <dgm:txEffectClrLst/>
   </dgm:styleLbl>
   <dgm:styleLbl name="node1">
-    <dgm:fillClrLst>
+    <dgm:fillClrLst meth="repeat">
+      <a:schemeClr val="accent2"/>
+      <a:schemeClr val="accent3"/>
       <a:schemeClr val="accent4"/>
       <a:schemeClr val="accent5"/>
+      <a:schemeClr val="accent6"/>
     </dgm:fillClrLst>
     <dgm:linClrLst meth="repeat">
       <a:schemeClr val="lt1"/>
@@ -2755,13 +3032,19 @@
     <dgm:txEffectClrLst/>
   </dgm:styleLbl>
   <dgm:styleLbl name="alignNode1">
-    <dgm:fillClrLst>
+    <dgm:fillClrLst meth="repeat">
+      <a:schemeClr val="accent2"/>
+      <a:schemeClr val="accent3"/>
       <a:schemeClr val="accent4"/>
       <a:schemeClr val="accent5"/>
+      <a:schemeClr val="accent6"/>
     </dgm:fillClrLst>
-    <dgm:linClrLst>
+    <dgm:linClrLst meth="repeat">
+      <a:schemeClr val="accent2"/>
+      <a:schemeClr val="accent3"/>
       <a:schemeClr val="accent4"/>
       <a:schemeClr val="accent5"/>
+      <a:schemeClr val="accent6"/>
     </dgm:linClrLst>
     <dgm:effectClrLst/>
     <dgm:txLinClrLst/>
@@ -2769,9 +3052,12 @@
     <dgm:txEffectClrLst/>
   </dgm:styleLbl>
   <dgm:styleLbl name="lnNode1">
-    <dgm:fillClrLst>
+    <dgm:fillClrLst meth="repeat">
+      <a:schemeClr val="accent2"/>
+      <a:schemeClr val="accent3"/>
       <a:schemeClr val="accent4"/>
       <a:schemeClr val="accent5"/>
+      <a:schemeClr val="accent6"/>
     </dgm:fillClrLst>
     <dgm:linClrLst meth="repeat">
       <a:schemeClr val="lt1"/>
@@ -2782,11 +3068,20 @@
     <dgm:txEffectClrLst/>
   </dgm:styleLbl>
   <dgm:styleLbl name="vennNode1">
-    <dgm:fillClrLst>
+    <dgm:fillClrLst meth="repeat">
+      <a:schemeClr val="accent2">
+        <a:alpha val="50000"/>
+      </a:schemeClr>
+      <a:schemeClr val="accent3">
+        <a:alpha val="50000"/>
+      </a:schemeClr>
       <a:schemeClr val="accent4">
         <a:alpha val="50000"/>
       </a:schemeClr>
       <a:schemeClr val="accent5">
+        <a:alpha val="50000"/>
+      </a:schemeClr>
+      <a:schemeClr val="accent6">
         <a:alpha val="50000"/>
       </a:schemeClr>
     </dgm:fillClrLst>
@@ -2800,7 +3095,7 @@
   </dgm:styleLbl>
   <dgm:styleLbl name="node2">
     <dgm:fillClrLst>
-      <a:schemeClr val="accent5"/>
+      <a:schemeClr val="accent2"/>
     </dgm:fillClrLst>
     <dgm:linClrLst meth="repeat">
       <a:schemeClr val="lt1"/>
@@ -2812,7 +3107,7 @@
   </dgm:styleLbl>
   <dgm:styleLbl name="node3">
     <dgm:fillClrLst>
-      <a:schemeClr val="accent6"/>
+      <a:schemeClr val="accent3"/>
     </dgm:fillClrLst>
     <dgm:linClrLst meth="repeat">
       <a:schemeClr val="lt1"/>
@@ -2824,7 +3119,7 @@
   </dgm:styleLbl>
   <dgm:styleLbl name="node4">
     <dgm:fillClrLst>
-      <a:schemeClr val="accent1"/>
+      <a:schemeClr val="accent4"/>
     </dgm:fillClrLst>
     <dgm:linClrLst meth="repeat">
       <a:schemeClr val="lt1"/>
@@ -2835,11 +3130,20 @@
     <dgm:txEffectClrLst/>
   </dgm:styleLbl>
   <dgm:styleLbl name="fgImgPlace1">
-    <dgm:fillClrLst>
+    <dgm:fillClrLst meth="repeat">
+      <a:schemeClr val="accent2">
+        <a:tint val="50000"/>
+      </a:schemeClr>
+      <a:schemeClr val="accent3">
+        <a:tint val="50000"/>
+      </a:schemeClr>
       <a:schemeClr val="accent4">
         <a:tint val="50000"/>
       </a:schemeClr>
       <a:schemeClr val="accent5">
+        <a:tint val="50000"/>
+      </a:schemeClr>
+      <a:schemeClr val="accent6">
         <a:tint val="50000"/>
       </a:schemeClr>
     </dgm:fillClrLst>
@@ -2855,10 +3159,10 @@
   </dgm:styleLbl>
   <dgm:styleLbl name="alignImgPlace1">
     <dgm:fillClrLst>
-      <a:schemeClr val="accent4">
+      <a:schemeClr val="accent1">
         <a:tint val="50000"/>
       </a:schemeClr>
-      <a:schemeClr val="accent5">
+      <a:schemeClr val="accent2">
         <a:tint val="20000"/>
       </a:schemeClr>
     </dgm:fillClrLst>
@@ -2874,10 +3178,10 @@
   </dgm:styleLbl>
   <dgm:styleLbl name="bgImgPlace1">
     <dgm:fillClrLst>
-      <a:schemeClr val="accent4">
+      <a:schemeClr val="accent1">
         <a:tint val="50000"/>
       </a:schemeClr>
-      <a:schemeClr val="accent5">
+      <a:schemeClr val="accent2">
         <a:tint val="20000"/>
       </a:schemeClr>
     </dgm:fillClrLst>
@@ -2892,11 +3196,14 @@
     <dgm:txEffectClrLst/>
   </dgm:styleLbl>
   <dgm:styleLbl name="sibTrans2D1">
-    <dgm:fillClrLst>
+    <dgm:fillClrLst meth="repeat">
+      <a:schemeClr val="accent2"/>
+      <a:schemeClr val="accent3"/>
       <a:schemeClr val="accent4"/>
       <a:schemeClr val="accent5"/>
+      <a:schemeClr val="accent6"/>
     </dgm:fillClrLst>
-    <dgm:linClrLst meth="repeat">
+    <dgm:linClrLst meth="cycle">
       <a:schemeClr val="lt1"/>
     </dgm:linClrLst>
     <dgm:effectClrLst/>
@@ -2905,11 +3212,14 @@
     <dgm:txEffectClrLst/>
   </dgm:styleLbl>
   <dgm:styleLbl name="fgSibTrans2D1">
-    <dgm:fillClrLst>
+    <dgm:fillClrLst meth="repeat">
+      <a:schemeClr val="accent2"/>
+      <a:schemeClr val="accent3"/>
       <a:schemeClr val="accent4"/>
       <a:schemeClr val="accent5"/>
+      <a:schemeClr val="accent6"/>
     </dgm:fillClrLst>
-    <dgm:linClrLst meth="repeat">
+    <dgm:linClrLst meth="cycle">
       <a:schemeClr val="lt1"/>
     </dgm:linClrLst>
     <dgm:effectClrLst/>
@@ -2920,11 +3230,14 @@
     <dgm:txEffectClrLst/>
   </dgm:styleLbl>
   <dgm:styleLbl name="bgSibTrans2D1">
-    <dgm:fillClrLst>
+    <dgm:fillClrLst meth="repeat">
+      <a:schemeClr val="accent2"/>
+      <a:schemeClr val="accent3"/>
       <a:schemeClr val="accent4"/>
       <a:schemeClr val="accent5"/>
+      <a:schemeClr val="accent6"/>
     </dgm:fillClrLst>
-    <dgm:linClrLst meth="repeat">
+    <dgm:linClrLst meth="cycle">
       <a:schemeClr val="lt1"/>
     </dgm:linClrLst>
     <dgm:effectClrLst/>
@@ -2935,10 +3248,19 @@
     <dgm:txEffectClrLst/>
   </dgm:styleLbl>
   <dgm:styleLbl name="sibTrans1D1">
-    <dgm:fillClrLst/>
-    <dgm:linClrLst>
+    <dgm:fillClrLst meth="repeat">
+      <a:schemeClr val="accent2"/>
+      <a:schemeClr val="accent3"/>
       <a:schemeClr val="accent4"/>
       <a:schemeClr val="accent5"/>
+      <a:schemeClr val="accent6"/>
+    </dgm:fillClrLst>
+    <dgm:linClrLst meth="repeat">
+      <a:schemeClr val="accent2"/>
+      <a:schemeClr val="accent3"/>
+      <a:schemeClr val="accent4"/>
+      <a:schemeClr val="accent5"/>
+      <a:schemeClr val="accent6"/>
     </dgm:linClrLst>
     <dgm:effectClrLst/>
     <dgm:txLinClrLst/>
@@ -2949,10 +3271,10 @@
   </dgm:styleLbl>
   <dgm:styleLbl name="callout">
     <dgm:fillClrLst meth="repeat">
-      <a:schemeClr val="accent4"/>
+      <a:schemeClr val="accent2"/>
     </dgm:fillClrLst>
     <dgm:linClrLst meth="repeat">
-      <a:schemeClr val="accent4">
+      <a:schemeClr val="accent2">
         <a:tint val="50000"/>
       </a:schemeClr>
     </dgm:linClrLst>
@@ -2965,12 +3287,10 @@
   </dgm:styleLbl>
   <dgm:styleLbl name="asst0">
     <dgm:fillClrLst meth="repeat">
-      <a:schemeClr val="accent4"/>
+      <a:schemeClr val="accent1"/>
     </dgm:fillClrLst>
     <dgm:linClrLst meth="repeat">
-      <a:schemeClr val="lt1">
-        <a:shade val="80000"/>
-      </a:schemeClr>
+      <a:schemeClr val="lt1"/>
     </dgm:linClrLst>
     <dgm:effectClrLst/>
     <dgm:txLinClrLst/>
@@ -2979,12 +3299,10 @@
   </dgm:styleLbl>
   <dgm:styleLbl name="asst1">
     <dgm:fillClrLst meth="repeat">
-      <a:schemeClr val="accent5"/>
+      <a:schemeClr val="accent2"/>
     </dgm:fillClrLst>
     <dgm:linClrLst meth="repeat">
-      <a:schemeClr val="lt1">
-        <a:shade val="80000"/>
-      </a:schemeClr>
+      <a:schemeClr val="lt1"/>
     </dgm:linClrLst>
     <dgm:effectClrLst/>
     <dgm:txLinClrLst/>
@@ -2993,7 +3311,7 @@
   </dgm:styleLbl>
   <dgm:styleLbl name="asst2">
     <dgm:fillClrLst>
-      <a:schemeClr val="accent6"/>
+      <a:schemeClr val="accent3"/>
     </dgm:fillClrLst>
     <dgm:linClrLst meth="repeat">
       <a:schemeClr val="lt1"/>
@@ -3005,7 +3323,7 @@
   </dgm:styleLbl>
   <dgm:styleLbl name="asst3">
     <dgm:fillClrLst>
-      <a:schemeClr val="accent1"/>
+      <a:schemeClr val="accent4"/>
     </dgm:fillClrLst>
     <dgm:linClrLst meth="repeat">
       <a:schemeClr val="lt1"/>
@@ -3017,7 +3335,7 @@
   </dgm:styleLbl>
   <dgm:styleLbl name="asst4">
     <dgm:fillClrLst>
-      <a:schemeClr val="accent2"/>
+      <a:schemeClr val="accent5"/>
     </dgm:fillClrLst>
     <dgm:linClrLst meth="repeat">
       <a:schemeClr val="lt1"/>
@@ -3029,7 +3347,7 @@
   </dgm:styleLbl>
   <dgm:styleLbl name="parChTrans2D1">
     <dgm:fillClrLst meth="repeat">
-      <a:schemeClr val="accent4"/>
+      <a:schemeClr val="accent2"/>
     </dgm:fillClrLst>
     <dgm:linClrLst meth="repeat">
       <a:schemeClr val="lt1"/>
@@ -3043,7 +3361,7 @@
   </dgm:styleLbl>
   <dgm:styleLbl name="parChTrans2D2">
     <dgm:fillClrLst meth="repeat">
-      <a:schemeClr val="accent5"/>
+      <a:schemeClr val="accent3"/>
     </dgm:fillClrLst>
     <dgm:linClrLst meth="repeat">
       <a:schemeClr val="lt1"/>
@@ -3055,7 +3373,7 @@
   </dgm:styleLbl>
   <dgm:styleLbl name="parChTrans2D3">
     <dgm:fillClrLst meth="repeat">
-      <a:schemeClr val="accent5"/>
+      <a:schemeClr val="accent4"/>
     </dgm:fillClrLst>
     <dgm:linClrLst meth="repeat">
       <a:schemeClr val="lt1"/>
@@ -3067,7 +3385,7 @@
   </dgm:styleLbl>
   <dgm:styleLbl name="parChTrans2D4">
     <dgm:fillClrLst meth="repeat">
-      <a:schemeClr val="accent6"/>
+      <a:schemeClr val="accent5"/>
     </dgm:fillClrLst>
     <dgm:linClrLst meth="repeat">
       <a:schemeClr val="lt1"/>
@@ -3081,10 +3399,10 @@
   </dgm:styleLbl>
   <dgm:styleLbl name="parChTrans1D1">
     <dgm:fillClrLst meth="repeat">
-      <a:schemeClr val="accent4"/>
+      <a:schemeClr val="accent2"/>
     </dgm:fillClrLst>
     <dgm:linClrLst meth="repeat">
-      <a:schemeClr val="accent4"/>
+      <a:schemeClr val="accent1"/>
     </dgm:linClrLst>
     <dgm:effectClrLst/>
     <dgm:txLinClrLst/>
@@ -3095,12 +3413,12 @@
   </dgm:styleLbl>
   <dgm:styleLbl name="parChTrans1D2">
     <dgm:fillClrLst meth="repeat">
-      <a:schemeClr val="accent4">
+      <a:schemeClr val="accent3">
         <a:tint val="90000"/>
       </a:schemeClr>
     </dgm:fillClrLst>
     <dgm:linClrLst meth="repeat">
-      <a:schemeClr val="accent5"/>
+      <a:schemeClr val="accent2"/>
     </dgm:linClrLst>
     <dgm:effectClrLst/>
     <dgm:txLinClrLst/>
@@ -3116,7 +3434,7 @@
       </a:schemeClr>
     </dgm:fillClrLst>
     <dgm:linClrLst meth="repeat">
-      <a:schemeClr val="accent6"/>
+      <a:schemeClr val="accent3"/>
     </dgm:linClrLst>
     <dgm:effectClrLst/>
     <dgm:txLinClrLst/>
@@ -3127,12 +3445,12 @@
   </dgm:styleLbl>
   <dgm:styleLbl name="parChTrans1D4">
     <dgm:fillClrLst meth="repeat">
-      <a:schemeClr val="accent4">
+      <a:schemeClr val="accent5">
         <a:tint val="50000"/>
       </a:schemeClr>
     </dgm:fillClrLst>
     <dgm:linClrLst meth="repeat">
-      <a:schemeClr val="accent1"/>
+      <a:schemeClr val="accent4"/>
     </dgm:linClrLst>
     <dgm:effectClrLst/>
     <dgm:txLinClrLst/>
@@ -3147,9 +3465,12 @@
         <a:alpha val="90000"/>
       </a:schemeClr>
     </dgm:fillClrLst>
-    <dgm:linClrLst>
+    <dgm:linClrLst meth="repeat">
+      <a:schemeClr val="accent2"/>
+      <a:schemeClr val="accent3"/>
       <a:schemeClr val="accent4"/>
       <a:schemeClr val="accent5"/>
+      <a:schemeClr val="accent6"/>
     </dgm:linClrLst>
     <dgm:effectClrLst/>
     <dgm:txLinClrLst/>
@@ -3164,9 +3485,12 @@
         <a:alpha val="90000"/>
       </a:schemeClr>
     </dgm:fillClrLst>
-    <dgm:linClrLst>
+    <dgm:linClrLst meth="repeat">
+      <a:schemeClr val="accent2"/>
+      <a:schemeClr val="accent3"/>
       <a:schemeClr val="accent4"/>
       <a:schemeClr val="accent5"/>
+      <a:schemeClr val="accent6"/>
     </dgm:linClrLst>
     <dgm:effectClrLst/>
     <dgm:txLinClrLst/>
@@ -3181,9 +3505,12 @@
         <a:alpha val="90000"/>
       </a:schemeClr>
     </dgm:fillClrLst>
-    <dgm:linClrLst>
+    <dgm:linClrLst meth="repeat">
+      <a:schemeClr val="accent2"/>
+      <a:schemeClr val="accent3"/>
       <a:schemeClr val="accent4"/>
       <a:schemeClr val="accent5"/>
+      <a:schemeClr val="accent6"/>
     </dgm:linClrLst>
     <dgm:effectClrLst/>
     <dgm:txLinClrLst/>
@@ -3199,7 +3526,7 @@
       </a:schemeClr>
     </dgm:fillClrLst>
     <dgm:linClrLst meth="repeat">
-      <a:schemeClr val="accent4"/>
+      <a:schemeClr val="accent1"/>
     </dgm:linClrLst>
     <dgm:effectClrLst/>
     <dgm:txLinClrLst/>
@@ -3214,9 +3541,12 @@
         <a:alpha val="90000"/>
       </a:schemeClr>
     </dgm:fillClrLst>
-    <dgm:linClrLst>
+    <dgm:linClrLst meth="repeat">
+      <a:schemeClr val="accent2"/>
+      <a:schemeClr val="accent3"/>
       <a:schemeClr val="accent4"/>
       <a:schemeClr val="accent5"/>
+      <a:schemeClr val="accent6"/>
     </dgm:linClrLst>
     <dgm:effectClrLst/>
     <dgm:txLinClrLst/>
@@ -3229,9 +3559,12 @@
     <dgm:fillClrLst meth="repeat">
       <a:schemeClr val="lt1"/>
     </dgm:fillClrLst>
-    <dgm:linClrLst>
+    <dgm:linClrLst meth="repeat">
+      <a:schemeClr val="accent2"/>
+      <a:schemeClr val="accent3"/>
       <a:schemeClr val="accent4"/>
       <a:schemeClr val="accent5"/>
+      <a:schemeClr val="accent6"/>
     </dgm:linClrLst>
     <dgm:effectClrLst/>
     <dgm:txLinClrLst/>
@@ -3244,9 +3577,12 @@
     <dgm:fillClrLst meth="repeat">
       <a:schemeClr val="lt1"/>
     </dgm:fillClrLst>
-    <dgm:linClrLst>
+    <dgm:linClrLst meth="repeat">
+      <a:schemeClr val="accent2"/>
+      <a:schemeClr val="accent3"/>
       <a:schemeClr val="accent4"/>
       <a:schemeClr val="accent5"/>
+      <a:schemeClr val="accent6"/>
     </dgm:linClrLst>
     <dgm:effectClrLst/>
     <dgm:txLinClrLst/>
@@ -3259,9 +3595,12 @@
     <dgm:fillClrLst meth="repeat">
       <a:schemeClr val="lt1"/>
     </dgm:fillClrLst>
-    <dgm:linClrLst>
+    <dgm:linClrLst meth="repeat">
+      <a:schemeClr val="accent2"/>
+      <a:schemeClr val="accent3"/>
       <a:schemeClr val="accent4"/>
       <a:schemeClr val="accent5"/>
+      <a:schemeClr val="accent6"/>
     </dgm:linClrLst>
     <dgm:effectClrLst/>
     <dgm:txLinClrLst/>
@@ -3271,7 +3610,15 @@
     <dgm:txEffectClrLst/>
   </dgm:styleLbl>
   <dgm:styleLbl name="fgAccFollowNode1">
-    <dgm:fillClrLst>
+    <dgm:fillClrLst meth="repeat">
+      <a:schemeClr val="accent2">
+        <a:tint val="40000"/>
+        <a:alpha val="90000"/>
+      </a:schemeClr>
+      <a:schemeClr val="accent3">
+        <a:tint val="40000"/>
+        <a:alpha val="90000"/>
+      </a:schemeClr>
       <a:schemeClr val="accent4">
         <a:tint val="40000"/>
         <a:alpha val="90000"/>
@@ -3280,13 +3627,29 @@
         <a:tint val="40000"/>
         <a:alpha val="90000"/>
       </a:schemeClr>
+      <a:schemeClr val="accent6">
+        <a:tint val="40000"/>
+        <a:alpha val="90000"/>
+      </a:schemeClr>
     </dgm:fillClrLst>
-    <dgm:linClrLst>
+    <dgm:linClrLst meth="repeat">
+      <a:schemeClr val="accent2">
+        <a:tint val="40000"/>
+        <a:alpha val="90000"/>
+      </a:schemeClr>
+      <a:schemeClr val="accent3">
+        <a:tint val="40000"/>
+        <a:alpha val="90000"/>
+      </a:schemeClr>
       <a:schemeClr val="accent4">
         <a:tint val="40000"/>
         <a:alpha val="90000"/>
       </a:schemeClr>
       <a:schemeClr val="accent5">
+        <a:tint val="40000"/>
+        <a:alpha val="90000"/>
+      </a:schemeClr>
+      <a:schemeClr val="accent6">
         <a:tint val="40000"/>
         <a:alpha val="90000"/>
       </a:schemeClr>
@@ -3299,7 +3662,15 @@
     <dgm:txEffectClrLst/>
   </dgm:styleLbl>
   <dgm:styleLbl name="alignAccFollowNode1">
-    <dgm:fillClrLst>
+    <dgm:fillClrLst meth="repeat">
+      <a:schemeClr val="accent2">
+        <a:tint val="40000"/>
+        <a:alpha val="90000"/>
+      </a:schemeClr>
+      <a:schemeClr val="accent3">
+        <a:tint val="40000"/>
+        <a:alpha val="90000"/>
+      </a:schemeClr>
       <a:schemeClr val="accent4">
         <a:tint val="40000"/>
         <a:alpha val="90000"/>
@@ -3308,13 +3679,29 @@
         <a:tint val="40000"/>
         <a:alpha val="90000"/>
       </a:schemeClr>
+      <a:schemeClr val="accent6">
+        <a:tint val="40000"/>
+        <a:alpha val="90000"/>
+      </a:schemeClr>
     </dgm:fillClrLst>
-    <dgm:linClrLst>
+    <dgm:linClrLst meth="repeat">
+      <a:schemeClr val="accent2">
+        <a:tint val="40000"/>
+        <a:alpha val="90000"/>
+      </a:schemeClr>
+      <a:schemeClr val="accent3">
+        <a:tint val="40000"/>
+        <a:alpha val="90000"/>
+      </a:schemeClr>
       <a:schemeClr val="accent4">
         <a:tint val="40000"/>
         <a:alpha val="90000"/>
       </a:schemeClr>
       <a:schemeClr val="accent5">
+        <a:tint val="40000"/>
+        <a:alpha val="90000"/>
+      </a:schemeClr>
+      <a:schemeClr val="accent6">
         <a:tint val="40000"/>
         <a:alpha val="90000"/>
       </a:schemeClr>
@@ -3327,7 +3714,15 @@
     <dgm:txEffectClrLst/>
   </dgm:styleLbl>
   <dgm:styleLbl name="bgAccFollowNode1">
-    <dgm:fillClrLst>
+    <dgm:fillClrLst meth="repeat">
+      <a:schemeClr val="accent2">
+        <a:tint val="40000"/>
+        <a:alpha val="90000"/>
+      </a:schemeClr>
+      <a:schemeClr val="accent3">
+        <a:tint val="40000"/>
+        <a:alpha val="90000"/>
+      </a:schemeClr>
       <a:schemeClr val="accent4">
         <a:tint val="40000"/>
         <a:alpha val="90000"/>
@@ -3336,13 +3731,29 @@
         <a:tint val="40000"/>
         <a:alpha val="90000"/>
       </a:schemeClr>
+      <a:schemeClr val="accent6">
+        <a:tint val="40000"/>
+        <a:alpha val="90000"/>
+      </a:schemeClr>
     </dgm:fillClrLst>
-    <dgm:linClrLst>
+    <dgm:linClrLst meth="repeat">
+      <a:schemeClr val="accent2">
+        <a:tint val="40000"/>
+        <a:alpha val="90000"/>
+      </a:schemeClr>
+      <a:schemeClr val="accent3">
+        <a:tint val="40000"/>
+        <a:alpha val="90000"/>
+      </a:schemeClr>
       <a:schemeClr val="accent4">
         <a:tint val="40000"/>
         <a:alpha val="90000"/>
       </a:schemeClr>
       <a:schemeClr val="accent5">
+        <a:tint val="40000"/>
+        <a:alpha val="90000"/>
+      </a:schemeClr>
+      <a:schemeClr val="accent6">
         <a:tint val="40000"/>
         <a:alpha val="90000"/>
       </a:schemeClr>
@@ -3361,7 +3772,7 @@
       </a:schemeClr>
     </dgm:fillClrLst>
     <dgm:linClrLst>
-      <a:schemeClr val="accent3"/>
+      <a:schemeClr val="accent1"/>
     </dgm:linClrLst>
     <dgm:effectClrLst/>
     <dgm:txLinClrLst/>
@@ -3377,7 +3788,7 @@
       </a:schemeClr>
     </dgm:fillClrLst>
     <dgm:linClrLst>
-      <a:schemeClr val="accent5"/>
+      <a:schemeClr val="accent2"/>
     </dgm:linClrLst>
     <dgm:effectClrLst/>
     <dgm:txLinClrLst/>
@@ -3393,7 +3804,7 @@
       </a:schemeClr>
     </dgm:fillClrLst>
     <dgm:linClrLst>
-      <a:schemeClr val="accent6"/>
+      <a:schemeClr val="accent3"/>
     </dgm:linClrLst>
     <dgm:effectClrLst/>
     <dgm:txLinClrLst/>
@@ -3409,7 +3820,7 @@
       </a:schemeClr>
     </dgm:fillClrLst>
     <dgm:linClrLst>
-      <a:schemeClr val="accent1"/>
+      <a:schemeClr val="accent4"/>
     </dgm:linClrLst>
     <dgm:effectClrLst/>
     <dgm:txLinClrLst/>
@@ -3420,7 +3831,7 @@
   </dgm:styleLbl>
   <dgm:styleLbl name="bgShp">
     <dgm:fillClrLst meth="repeat">
-      <a:schemeClr val="accent4">
+      <a:schemeClr val="accent2">
         <a:tint val="40000"/>
       </a:schemeClr>
     </dgm:fillClrLst>
@@ -3436,7 +3847,7 @@
   </dgm:styleLbl>
   <dgm:styleLbl name="dkBgShp">
     <dgm:fillClrLst meth="repeat">
-      <a:schemeClr val="accent4">
+      <a:schemeClr val="accent2">
         <a:shade val="90000"/>
       </a:schemeClr>
     </dgm:fillClrLst>
@@ -3452,13 +3863,13 @@
   </dgm:styleLbl>
   <dgm:styleLbl name="trBgShp">
     <dgm:fillClrLst meth="repeat">
-      <a:schemeClr val="accent4">
+      <a:schemeClr val="accent1">
         <a:tint val="50000"/>
         <a:alpha val="40000"/>
       </a:schemeClr>
     </dgm:fillClrLst>
     <dgm:linClrLst meth="repeat">
-      <a:schemeClr val="accent4"/>
+      <a:schemeClr val="accent2"/>
     </dgm:linClrLst>
     <dgm:effectClrLst/>
     <dgm:txLinClrLst/>
@@ -3469,7 +3880,7 @@
   </dgm:styleLbl>
   <dgm:styleLbl name="fgShp">
     <dgm:fillClrLst meth="repeat">
-      <a:schemeClr val="accent4">
+      <a:schemeClr val="accent2">
         <a:tint val="40000"/>
       </a:schemeClr>
     </dgm:fillClrLst>
@@ -3508,7 +3919,7 @@
 <dgm:dataModel xmlns:dgm="http://schemas.openxmlformats.org/drawingml/2006/diagram" xmlns:a="http://schemas.openxmlformats.org/drawingml/2006/main">
   <dgm:ptLst>
     <dgm:pt modelId="{222E1EF8-A4C3-4B3F-BC7A-AB006B26AA28}" type="doc">
-      <dgm:prSet loTypeId="urn:microsoft.com/office/officeart/2005/8/layout/equation1" loCatId="relationship" qsTypeId="urn:microsoft.com/office/officeart/2005/8/quickstyle/3d4" qsCatId="3D" csTypeId="urn:microsoft.com/office/officeart/2005/8/colors/colorful4" csCatId="colorful" phldr="1"/>
+      <dgm:prSet loTypeId="urn:microsoft.com/office/officeart/2005/8/layout/equation1" loCatId="relationship" qsTypeId="urn:microsoft.com/office/officeart/2005/8/quickstyle/3d4" qsCatId="3D" csTypeId="urn:microsoft.com/office/officeart/2005/8/colors/colorful1" csCatId="colorful" phldr="1"/>
       <dgm:spPr/>
     </dgm:pt>
     <dgm:pt modelId="{C3BC6139-1480-48B7-A184-9DDCEA85B44C}">
@@ -3555,11 +3966,19 @@
         <a:lstStyle/>
         <a:p>
           <a:r>
-            <a:rPr lang="en-US" dirty="0" err="1"/>
+            <a:rPr lang="en-US" dirty="0" err="1">
+              <a:solidFill>
+                <a:schemeClr val="accent4"/>
+              </a:solidFill>
+            </a:rPr>
             <a:t>Shrinker</a:t>
           </a:r>
           <a:r>
-            <a:rPr lang="en-US" dirty="0"/>
+            <a:rPr lang="en-US" dirty="0">
+              <a:solidFill>
+                <a:schemeClr val="accent4"/>
+              </a:solidFill>
+            </a:rPr>
             <a:t> (of T)</a:t>
           </a:r>
         </a:p>
@@ -3715,7 +4134,7 @@
 <dgm:dataModel xmlns:dgm="http://schemas.openxmlformats.org/drawingml/2006/diagram" xmlns:a="http://schemas.openxmlformats.org/drawingml/2006/main">
   <dgm:ptLst>
     <dgm:pt modelId="{CAE1D68B-5872-431D-929D-5846171ADFC0}" type="doc">
-      <dgm:prSet loTypeId="urn:microsoft.com/office/officeart/2005/8/layout/lProcess1" loCatId="process" qsTypeId="urn:microsoft.com/office/officeart/2005/8/quickstyle/3d4" qsCatId="3D" csTypeId="urn:microsoft.com/office/officeart/2005/8/colors/colorful4" csCatId="colorful" phldr="1"/>
+      <dgm:prSet loTypeId="urn:microsoft.com/office/officeart/2005/8/layout/lProcess1" loCatId="process" qsTypeId="urn:microsoft.com/office/officeart/2005/8/quickstyle/3d4" qsCatId="3D" csTypeId="urn:microsoft.com/office/officeart/2005/8/colors/colorful1" csCatId="colorful" phldr="1"/>
       <dgm:spPr/>
     </dgm:pt>
     <dgm:pt modelId="{BB931A9A-D139-44E1-899B-ABE69424AF1A}">
@@ -3798,7 +4217,11 @@
         <a:lstStyle/>
         <a:p>
           <a:r>
-            <a:rPr lang="en-US" dirty="0"/>
+            <a:rPr lang="en-US" dirty="0">
+              <a:solidFill>
+                <a:schemeClr val="accent4"/>
+              </a:solidFill>
+            </a:rPr>
             <a:t>Gen&lt;Address&gt;</a:t>
           </a:r>
         </a:p>
@@ -4062,7 +4485,7 @@
 <dgm:dataModel xmlns:dgm="http://schemas.openxmlformats.org/drawingml/2006/diagram" xmlns:a="http://schemas.openxmlformats.org/drawingml/2006/main">
   <dgm:ptLst>
     <dgm:pt modelId="{A3973FD7-4E78-4038-A7A7-B61DB0D08809}" type="doc">
-      <dgm:prSet loTypeId="urn:microsoft.com/office/officeart/2009/3/layout/IncreasingArrowsProcess" loCatId="process" qsTypeId="urn:microsoft.com/office/officeart/2005/8/quickstyle/3d4" qsCatId="3D" csTypeId="urn:microsoft.com/office/officeart/2005/8/colors/colorful4" csCatId="colorful" phldr="1"/>
+      <dgm:prSet loTypeId="urn:microsoft.com/office/officeart/2009/3/layout/IncreasingArrowsProcess" loCatId="process" qsTypeId="urn:microsoft.com/office/officeart/2005/8/quickstyle/3d4" qsCatId="3D" csTypeId="urn:microsoft.com/office/officeart/2005/8/colors/colorful1" csCatId="colorful" phldr="1"/>
       <dgm:spPr/>
       <dgm:t>
         <a:bodyPr/>
@@ -4161,10 +4584,18 @@
         <a:lstStyle/>
         <a:p>
           <a:r>
-            <a:rPr lang="en-US"/>
+            <a:rPr lang="en-US">
+              <a:solidFill>
+                <a:schemeClr val="accent4"/>
+              </a:solidFill>
+            </a:rPr>
             <a:t>Size = 0: shrink []</a:t>
           </a:r>
-          <a:endParaRPr lang="en-US" dirty="0"/>
+          <a:endParaRPr lang="en-US" dirty="0">
+            <a:solidFill>
+              <a:schemeClr val="accent4"/>
+            </a:solidFill>
+          </a:endParaRPr>
         </a:p>
       </dgm:t>
     </dgm:pt>
@@ -4198,10 +4629,18 @@
         <a:lstStyle/>
         <a:p>
           <a:r>
-            <a:rPr lang="en-US"/>
+            <a:rPr lang="en-US">
+              <a:solidFill>
+                <a:schemeClr val="accent4"/>
+              </a:solidFill>
+            </a:rPr>
             <a:t>Size = 4: shrink [ 5,1,3,6 ]</a:t>
           </a:r>
-          <a:endParaRPr lang="en-US" dirty="0"/>
+          <a:endParaRPr lang="en-US" dirty="0">
+            <a:solidFill>
+              <a:schemeClr val="accent4"/>
+            </a:solidFill>
+          </a:endParaRPr>
         </a:p>
       </dgm:t>
     </dgm:pt>
@@ -4326,7 +4765,7 @@
           <a:avLst/>
         </a:prstGeom>
         <a:solidFill>
-          <a:schemeClr val="accent4">
+          <a:schemeClr val="accent2">
             <a:hueOff val="0"/>
             <a:satOff val="0"/>
             <a:lumOff val="0"/>
@@ -4402,7 +4841,7 @@
           <a:avLst/>
         </a:prstGeom>
         <a:solidFill>
-          <a:schemeClr val="accent4">
+          <a:schemeClr val="accent2">
             <a:hueOff val="0"/>
             <a:satOff val="0"/>
             <a:lumOff val="0"/>
@@ -4476,10 +4915,10 @@
           <a:avLst/>
         </a:prstGeom>
         <a:solidFill>
-          <a:schemeClr val="accent4">
-            <a:hueOff val="2400004"/>
-            <a:satOff val="19998"/>
-            <a:lumOff val="10001"/>
+          <a:schemeClr val="accent3">
+            <a:hueOff val="0"/>
+            <a:satOff val="0"/>
+            <a:lumOff val="0"/>
             <a:alphaOff val="0"/>
           </a:schemeClr>
         </a:solidFill>
@@ -4528,11 +4967,19 @@
             <a:buNone/>
           </a:pPr>
           <a:r>
-            <a:rPr lang="en-US" sz="2200" kern="1200" dirty="0" err="1"/>
+            <a:rPr lang="en-US" sz="2200" kern="1200" dirty="0" err="1">
+              <a:solidFill>
+                <a:schemeClr val="accent4"/>
+              </a:solidFill>
+            </a:rPr>
             <a:t>Shrinker</a:t>
           </a:r>
           <a:r>
-            <a:rPr lang="en-US" sz="2200" kern="1200" dirty="0"/>
+            <a:rPr lang="en-US" sz="2200" kern="1200" dirty="0">
+              <a:solidFill>
+                <a:schemeClr val="accent4"/>
+              </a:solidFill>
+            </a:rPr>
             <a:t> (of T)</a:t>
           </a:r>
         </a:p>
@@ -4556,10 +5003,10 @@
           <a:avLst/>
         </a:prstGeom>
         <a:solidFill>
-          <a:schemeClr val="accent4">
-            <a:hueOff val="4800007"/>
-            <a:satOff val="39997"/>
-            <a:lumOff val="20001"/>
+          <a:schemeClr val="accent3">
+            <a:hueOff val="0"/>
+            <a:satOff val="0"/>
+            <a:lumOff val="0"/>
             <a:alphaOff val="0"/>
           </a:schemeClr>
         </a:solidFill>
@@ -4631,9 +5078,9 @@
         </a:prstGeom>
         <a:solidFill>
           <a:schemeClr val="accent4">
-            <a:hueOff val="4800007"/>
-            <a:satOff val="39997"/>
-            <a:lumOff val="20001"/>
+            <a:hueOff val="0"/>
+            <a:satOff val="0"/>
+            <a:lumOff val="0"/>
             <a:alphaOff val="0"/>
           </a:schemeClr>
         </a:solidFill>
@@ -4720,7 +5167,7 @@
           </a:avLst>
         </a:prstGeom>
         <a:solidFill>
-          <a:schemeClr val="accent4">
+          <a:schemeClr val="accent2">
             <a:hueOff val="0"/>
             <a:satOff val="0"/>
             <a:lumOff val="0"/>
@@ -4799,7 +5246,7 @@
           </a:avLst>
         </a:prstGeom>
         <a:solidFill>
-          <a:schemeClr val="accent4">
+          <a:schemeClr val="accent2">
             <a:hueOff val="0"/>
             <a:satOff val="0"/>
             <a:lumOff val="0"/>
@@ -4850,7 +5297,7 @@
           </a:avLst>
         </a:prstGeom>
         <a:solidFill>
-          <a:schemeClr val="accent4">
+          <a:schemeClr val="accent2">
             <a:tint val="40000"/>
             <a:alpha val="90000"/>
             <a:hueOff val="0"/>
@@ -4861,7 +5308,7 @@
         </a:solidFill>
         <a:ln w="6350" cap="flat" cmpd="sng" algn="ctr">
           <a:solidFill>
-            <a:schemeClr val="accent4">
+            <a:schemeClr val="accent2">
               <a:tint val="40000"/>
               <a:alpha val="90000"/>
               <a:hueOff val="0"/>
@@ -4940,10 +5387,10 @@
           </a:avLst>
         </a:prstGeom>
         <a:solidFill>
-          <a:schemeClr val="accent4">
-            <a:hueOff val="2400004"/>
-            <a:satOff val="19998"/>
-            <a:lumOff val="10001"/>
+          <a:schemeClr val="accent3">
+            <a:hueOff val="0"/>
+            <a:satOff val="0"/>
+            <a:lumOff val="0"/>
             <a:alphaOff val="0"/>
           </a:schemeClr>
         </a:solidFill>
@@ -4992,7 +5439,11 @@
             <a:buNone/>
           </a:pPr>
           <a:r>
-            <a:rPr lang="en-US" sz="3000" kern="1200" dirty="0"/>
+            <a:rPr lang="en-US" sz="3000" kern="1200" dirty="0">
+              <a:solidFill>
+                <a:schemeClr val="accent4"/>
+              </a:solidFill>
+            </a:rPr>
             <a:t>Gen&lt;Address&gt;</a:t>
           </a:r>
         </a:p>
@@ -5019,10 +5470,10 @@
           </a:avLst>
         </a:prstGeom>
         <a:solidFill>
-          <a:schemeClr val="accent4">
-            <a:hueOff val="2400004"/>
-            <a:satOff val="19998"/>
-            <a:lumOff val="10001"/>
+          <a:schemeClr val="accent3">
+            <a:hueOff val="0"/>
+            <a:satOff val="0"/>
+            <a:lumOff val="0"/>
             <a:alphaOff val="0"/>
           </a:schemeClr>
         </a:solidFill>
@@ -5070,23 +5521,23 @@
           </a:avLst>
         </a:prstGeom>
         <a:solidFill>
-          <a:schemeClr val="accent4">
+          <a:schemeClr val="accent3">
             <a:tint val="40000"/>
             <a:alpha val="90000"/>
-            <a:hueOff val="2225394"/>
-            <a:satOff val="27342"/>
-            <a:lumOff val="2402"/>
+            <a:hueOff val="0"/>
+            <a:satOff val="0"/>
+            <a:lumOff val="0"/>
             <a:alphaOff val="0"/>
           </a:schemeClr>
         </a:solidFill>
         <a:ln w="6350" cap="flat" cmpd="sng" algn="ctr">
           <a:solidFill>
-            <a:schemeClr val="accent4">
+            <a:schemeClr val="accent3">
               <a:tint val="40000"/>
               <a:alpha val="90000"/>
-              <a:hueOff val="2225394"/>
-              <a:satOff val="27342"/>
-              <a:lumOff val="2402"/>
+              <a:hueOff val="0"/>
+              <a:satOff val="0"/>
+              <a:lumOff val="0"/>
               <a:alphaOff val="0"/>
             </a:schemeClr>
           </a:solidFill>
@@ -5161,9 +5612,9 @@
         </a:prstGeom>
         <a:solidFill>
           <a:schemeClr val="accent4">
-            <a:hueOff val="4800007"/>
-            <a:satOff val="39997"/>
-            <a:lumOff val="20001"/>
+            <a:hueOff val="0"/>
+            <a:satOff val="0"/>
+            <a:lumOff val="0"/>
             <a:alphaOff val="0"/>
           </a:schemeClr>
         </a:solidFill>
@@ -5240,9 +5691,9 @@
         </a:prstGeom>
         <a:solidFill>
           <a:schemeClr val="accent4">
-            <a:hueOff val="4800007"/>
-            <a:satOff val="39997"/>
-            <a:lumOff val="20001"/>
+            <a:hueOff val="0"/>
+            <a:satOff val="0"/>
+            <a:lumOff val="0"/>
             <a:alphaOff val="0"/>
           </a:schemeClr>
         </a:solidFill>
@@ -5293,9 +5744,9 @@
           <a:schemeClr val="accent4">
             <a:tint val="40000"/>
             <a:alpha val="90000"/>
-            <a:hueOff val="4450789"/>
-            <a:satOff val="54684"/>
-            <a:lumOff val="4805"/>
+            <a:hueOff val="0"/>
+            <a:satOff val="0"/>
+            <a:lumOff val="0"/>
             <a:alphaOff val="0"/>
           </a:schemeClr>
         </a:solidFill>
@@ -5304,9 +5755,9 @@
             <a:schemeClr val="accent4">
               <a:tint val="40000"/>
               <a:alpha val="90000"/>
-              <a:hueOff val="4450789"/>
-              <a:satOff val="54684"/>
-              <a:lumOff val="4805"/>
+              <a:hueOff val="0"/>
+              <a:satOff val="0"/>
+              <a:lumOff val="0"/>
               <a:alphaOff val="0"/>
             </a:schemeClr>
           </a:solidFill>
@@ -5393,7 +5844,7 @@
           </a:avLst>
         </a:prstGeom>
         <a:solidFill>
-          <a:schemeClr val="accent4">
+          <a:schemeClr val="accent2">
             <a:hueOff val="0"/>
             <a:satOff val="0"/>
             <a:lumOff val="0"/>
@@ -5481,10 +5932,10 @@
           </a:avLst>
         </a:prstGeom>
         <a:solidFill>
-          <a:schemeClr val="accent4">
-            <a:hueOff val="1600002"/>
-            <a:satOff val="13332"/>
-            <a:lumOff val="6667"/>
+          <a:schemeClr val="accent3">
+            <a:hueOff val="0"/>
+            <a:satOff val="0"/>
+            <a:lumOff val="0"/>
             <a:alphaOff val="0"/>
           </a:schemeClr>
         </a:solidFill>
@@ -5533,10 +5984,18 @@
             <a:buNone/>
           </a:pPr>
           <a:r>
-            <a:rPr lang="en-US" sz="2000" kern="1200"/>
+            <a:rPr lang="en-US" sz="2000" kern="1200">
+              <a:solidFill>
+                <a:schemeClr val="accent4"/>
+              </a:solidFill>
+            </a:rPr>
             <a:t>Size = 4: shrink [ 5,1,3,6 ]</a:t>
           </a:r>
-          <a:endParaRPr lang="en-US" sz="2000" kern="1200" dirty="0"/>
+          <a:endParaRPr lang="en-US" sz="2000" kern="1200" dirty="0">
+            <a:solidFill>
+              <a:schemeClr val="accent4"/>
+            </a:solidFill>
+          </a:endParaRPr>
         </a:p>
       </dsp:txBody>
       <dsp:txXfrm>
@@ -5562,9 +6021,9 @@
         </a:prstGeom>
         <a:solidFill>
           <a:schemeClr val="accent4">
-            <a:hueOff val="3200005"/>
-            <a:satOff val="26665"/>
-            <a:lumOff val="13334"/>
+            <a:hueOff val="0"/>
+            <a:satOff val="0"/>
+            <a:lumOff val="0"/>
             <a:alphaOff val="0"/>
           </a:schemeClr>
         </a:solidFill>
@@ -5640,10 +6099,10 @@
           </a:avLst>
         </a:prstGeom>
         <a:solidFill>
-          <a:schemeClr val="accent4">
-            <a:hueOff val="4800007"/>
-            <a:satOff val="39997"/>
-            <a:lumOff val="20001"/>
+          <a:schemeClr val="accent5">
+            <a:hueOff val="0"/>
+            <a:satOff val="0"/>
+            <a:lumOff val="0"/>
             <a:alphaOff val="0"/>
           </a:schemeClr>
         </a:solidFill>
@@ -5692,10 +6151,18 @@
             <a:buNone/>
           </a:pPr>
           <a:r>
-            <a:rPr lang="en-US" sz="2000" kern="1200"/>
+            <a:rPr lang="en-US" sz="2000" kern="1200">
+              <a:solidFill>
+                <a:schemeClr val="accent4"/>
+              </a:solidFill>
+            </a:rPr>
             <a:t>Size = 0: shrink []</a:t>
           </a:r>
-          <a:endParaRPr lang="en-US" sz="2000" kern="1200" dirty="0"/>
+          <a:endParaRPr lang="en-US" sz="2000" kern="1200" dirty="0">
+            <a:solidFill>
+              <a:schemeClr val="accent4"/>
+            </a:solidFill>
+          </a:endParaRPr>
         </a:p>
       </dsp:txBody>
       <dsp:txXfrm>
@@ -10779,7 +11246,7 @@
           <a:p>
             <a:fld id="{792351EF-48F6-4A54-8506-ACD68070E42C}" type="datetimeFigureOut">
               <a:rPr lang="en-US" smtClean="0"/>
-              <a:t>2016-10-08</a:t>
+              <a:t>10-Jan-17</a:t>
             </a:fld>
             <a:endParaRPr lang="en-US"/>
           </a:p>
@@ -11105,11 +11572,15 @@
             </a:pPr>
             <a:r>
               <a:rPr lang="en-US" dirty="0"/>
-              <a:t>Associate Director at</a:t>
+              <a:t>Software Developer as </a:t>
+            </a:r>
+            <a:r>
+              <a:rPr lang="en-US" dirty="0" err="1"/>
+              <a:t>StatMuse</a:t>
             </a:r>
             <a:r>
               <a:rPr lang="en-US" baseline="0" dirty="0"/>
-              <a:t> Jet.com</a:t>
+              <a:t> Inc</a:t>
             </a:r>
           </a:p>
           <a:p>
@@ -11119,7 +11590,7 @@
             </a:pPr>
             <a:r>
               <a:rPr lang="en-US" baseline="0" dirty="0"/>
-              <a:t>Part of the team behind the pricing engine</a:t>
+              <a:t>Doing a mix of NLP, NLG, and ML</a:t>
             </a:r>
             <a:endParaRPr lang="en-US" dirty="0"/>
           </a:p>
@@ -11130,17 +11601,12 @@
             </a:pPr>
             <a:r>
               <a:rPr lang="en-US" dirty="0"/>
-              <a:t>17.5</a:t>
+              <a:t>18 years</a:t>
             </a:r>
             <a:r>
               <a:rPr lang="en-US" baseline="0" dirty="0"/>
-              <a:t> as a </a:t>
-            </a:r>
-            <a:r>
-              <a:rPr lang="en-US" baseline="0"/>
-              <a:t>professional developer</a:t>
-            </a:r>
-            <a:endParaRPr lang="en-US" baseline="0" dirty="0"/>
+              <a:t> as a professional developer</a:t>
+            </a:r>
           </a:p>
           <a:p>
             <a:pPr marL="171450" indent="-171450">
@@ -14853,9 +15319,9 @@
           <a:bodyPr/>
           <a:lstStyle/>
           <a:p>
-            <a:fld id="{84FC9A44-31BA-473D-90EB-2B4B506A8774}" type="datetime1">
+            <a:fld id="{99667D9C-57C2-48DC-8E2A-DB68D08E9ACB}" type="datetime1">
               <a:rPr lang="en-US" smtClean="0"/>
-              <a:t>2016-10-08</a:t>
+              <a:t>10-Jan-17</a:t>
             </a:fld>
             <a:endParaRPr lang="en-US"/>
           </a:p>
@@ -14878,7 +15344,7 @@
           <a:p>
             <a:r>
               <a:rPr lang="en-US"/>
-              <a:t>paulmichael@jet.com</a:t>
+              <a:t>paul@statmuse.com</a:t>
             </a:r>
             <a:endParaRPr lang="en-US" dirty="0"/>
           </a:p>
@@ -15034,9 +15500,9 @@
           <a:bodyPr/>
           <a:lstStyle/>
           <a:p>
-            <a:fld id="{A0D70A4E-4719-4060-8CE9-A64B77C1F437}" type="datetime1">
+            <a:fld id="{1CC3A3BF-CE84-473F-A166-732B16349B57}" type="datetime1">
               <a:rPr lang="en-US" smtClean="0"/>
-              <a:t>2016-10-08</a:t>
+              <a:t>10-Jan-17</a:t>
             </a:fld>
             <a:endParaRPr lang="en-US"/>
           </a:p>
@@ -15059,7 +15525,7 @@
           <a:p>
             <a:r>
               <a:rPr lang="en-US"/>
-              <a:t>paulmichael@jet.com</a:t>
+              <a:t>paul@statmuse.com</a:t>
             </a:r>
             <a:endParaRPr lang="en-US" dirty="0"/>
           </a:p>
@@ -15225,9 +15691,9 @@
           <a:bodyPr/>
           <a:lstStyle/>
           <a:p>
-            <a:fld id="{CD5C1A23-DD78-40CC-87F0-AEA8F03DBC64}" type="datetime1">
+            <a:fld id="{206A78A2-76F7-4A59-89D6-C34AB4BACB8B}" type="datetime1">
               <a:rPr lang="en-US" smtClean="0"/>
-              <a:t>2016-10-08</a:t>
+              <a:t>10-Jan-17</a:t>
             </a:fld>
             <a:endParaRPr lang="en-US"/>
           </a:p>
@@ -15250,7 +15716,7 @@
           <a:p>
             <a:r>
               <a:rPr lang="en-US"/>
-              <a:t>paulmichael@jet.com</a:t>
+              <a:t>paul@statmuse.com</a:t>
             </a:r>
             <a:endParaRPr lang="en-US" dirty="0"/>
           </a:p>
@@ -15406,9 +15872,9 @@
           <a:bodyPr/>
           <a:lstStyle/>
           <a:p>
-            <a:fld id="{EA0DD099-93A6-4C54-8EFC-51F7179FF08A}" type="datetime1">
+            <a:fld id="{795112BC-D96E-4E45-BCF8-224AF60D6BC7}" type="datetime1">
               <a:rPr lang="en-US" smtClean="0"/>
-              <a:t>2016-10-08</a:t>
+              <a:t>10-Jan-17</a:t>
             </a:fld>
             <a:endParaRPr lang="en-US"/>
           </a:p>
@@ -15431,7 +15897,7 @@
           <a:p>
             <a:r>
               <a:rPr lang="en-US"/>
-              <a:t>paulmichael@jet.com</a:t>
+              <a:t>paul@statmuse.com</a:t>
             </a:r>
             <a:endParaRPr lang="en-US" dirty="0"/>
           </a:p>
@@ -15664,9 +16130,9 @@
           <a:bodyPr/>
           <a:lstStyle/>
           <a:p>
-            <a:fld id="{438FA885-58E0-4914-AFB6-E1D2253F30DF}" type="datetime1">
+            <a:fld id="{96B8AAE4-B49E-40FE-A9FB-BE628D0C3160}" type="datetime1">
               <a:rPr lang="en-US" smtClean="0"/>
-              <a:t>2016-10-08</a:t>
+              <a:t>10-Jan-17</a:t>
             </a:fld>
             <a:endParaRPr lang="en-US"/>
           </a:p>
@@ -15689,7 +16155,7 @@
           <a:p>
             <a:r>
               <a:rPr lang="en-US"/>
-              <a:t>paulmichael@jet.com</a:t>
+              <a:t>paul@statmuse.com</a:t>
             </a:r>
             <a:endParaRPr lang="en-US" dirty="0"/>
           </a:p>
@@ -15906,9 +16372,9 @@
           <a:bodyPr/>
           <a:lstStyle/>
           <a:p>
-            <a:fld id="{18C5AAED-6FC4-403F-BCA4-E28A6479AE8E}" type="datetime1">
+            <a:fld id="{350D71F7-57E7-4660-811D-A8B9B4A4068B}" type="datetime1">
               <a:rPr lang="en-US" smtClean="0"/>
-              <a:t>2016-10-08</a:t>
+              <a:t>10-Jan-17</a:t>
             </a:fld>
             <a:endParaRPr lang="en-US"/>
           </a:p>
@@ -15931,7 +16397,7 @@
           <a:p>
             <a:r>
               <a:rPr lang="en-US"/>
-              <a:t>paulmichael@jet.com</a:t>
+              <a:t>paul@statmuse.com</a:t>
             </a:r>
             <a:endParaRPr lang="en-US" dirty="0"/>
           </a:p>
@@ -16283,9 +16749,9 @@
           <a:bodyPr/>
           <a:lstStyle/>
           <a:p>
-            <a:fld id="{80941D23-49EA-47ED-92AB-DF4E801CDC3B}" type="datetime1">
+            <a:fld id="{C992D08A-3315-4AC7-A91C-1ECE21D80F46}" type="datetime1">
               <a:rPr lang="en-US" smtClean="0"/>
-              <a:t>2016-10-08</a:t>
+              <a:t>10-Jan-17</a:t>
             </a:fld>
             <a:endParaRPr lang="en-US"/>
           </a:p>
@@ -16308,7 +16774,7 @@
           <a:p>
             <a:r>
               <a:rPr lang="en-US"/>
-              <a:t>paulmichael@jet.com</a:t>
+              <a:t>paul@statmuse.com</a:t>
             </a:r>
             <a:endParaRPr lang="en-US" dirty="0"/>
           </a:p>
@@ -16413,9 +16879,9 @@
           <a:bodyPr/>
           <a:lstStyle/>
           <a:p>
-            <a:fld id="{F8FB43DA-14DE-4464-89F5-BBC3D201E6FD}" type="datetime1">
+            <a:fld id="{1BC381D5-A5D8-40D3-9526-C13D5005AF7A}" type="datetime1">
               <a:rPr lang="en-US" smtClean="0"/>
-              <a:t>2016-10-08</a:t>
+              <a:t>10-Jan-17</a:t>
             </a:fld>
             <a:endParaRPr lang="en-US"/>
           </a:p>
@@ -16438,7 +16904,7 @@
           <a:p>
             <a:r>
               <a:rPr lang="en-US"/>
-              <a:t>paulmichael@jet.com</a:t>
+              <a:t>paul@statmuse.com</a:t>
             </a:r>
             <a:endParaRPr lang="en-US" dirty="0"/>
           </a:p>
@@ -16521,9 +16987,9 @@
           <a:bodyPr/>
           <a:lstStyle/>
           <a:p>
-            <a:fld id="{D127DAF6-8EB5-4C97-8010-ACFB1F63921D}" type="datetime1">
+            <a:fld id="{016834E5-7307-4859-B145-C2AFF27A1B96}" type="datetime1">
               <a:rPr lang="en-US" smtClean="0"/>
-              <a:t>2016-10-08</a:t>
+              <a:t>10-Jan-17</a:t>
             </a:fld>
             <a:endParaRPr lang="en-US" dirty="0"/>
           </a:p>
@@ -16546,7 +17012,7 @@
           <a:p>
             <a:r>
               <a:rPr lang="en-US"/>
-              <a:t>paulmichael@jet.com</a:t>
+              <a:t>paul@statmuse.com</a:t>
             </a:r>
             <a:endParaRPr lang="en-US" dirty="0"/>
           </a:p>
@@ -16809,9 +17275,9 @@
           <a:bodyPr/>
           <a:lstStyle/>
           <a:p>
-            <a:fld id="{42933535-5548-4F17-8697-4FDD620CAB2E}" type="datetime1">
+            <a:fld id="{359007DF-0F18-4593-8A45-989F234AE2E3}" type="datetime1">
               <a:rPr lang="en-US" smtClean="0"/>
-              <a:t>2016-10-08</a:t>
+              <a:t>10-Jan-17</a:t>
             </a:fld>
             <a:endParaRPr lang="en-US"/>
           </a:p>
@@ -16834,7 +17300,7 @@
           <a:p>
             <a:r>
               <a:rPr lang="en-US"/>
-              <a:t>paulmichael@jet.com</a:t>
+              <a:t>paul@statmuse.com</a:t>
             </a:r>
             <a:endParaRPr lang="en-US" dirty="0"/>
           </a:p>
@@ -17074,9 +17540,9 @@
           <a:bodyPr/>
           <a:lstStyle/>
           <a:p>
-            <a:fld id="{1CCE9BD6-450D-4862-9490-873171136554}" type="datetime1">
+            <a:fld id="{6930168A-CAF0-4244-8110-147FC2B86D05}" type="datetime1">
               <a:rPr lang="en-US" smtClean="0"/>
-              <a:t>2016-10-08</a:t>
+              <a:t>10-Jan-17</a:t>
             </a:fld>
             <a:endParaRPr lang="en-US"/>
           </a:p>
@@ -17099,7 +17565,7 @@
           <a:p>
             <a:r>
               <a:rPr lang="en-US"/>
-              <a:t>paulmichael@jet.com</a:t>
+              <a:t>paul@statmuse.com</a:t>
             </a:r>
             <a:endParaRPr lang="en-US" dirty="0"/>
           </a:p>
@@ -17293,10 +17759,9 @@
           </a:lstStyle>
           <a:p>
             <a:r>
-              <a:rPr lang="en-US"/>
-              <a:t>paulmichael@jet.com</a:t>
-            </a:r>
-            <a:endParaRPr lang="en-US" dirty="0"/>
+              <a:rPr lang="en-US" dirty="0"/>
+              <a:t>paul@statmuse.com</a:t>
+            </a:r>
           </a:p>
         </p:txBody>
       </p:sp>
@@ -17346,28 +17811,22 @@
       </p:sp>
       <p:pic>
         <p:nvPicPr>
-          <p:cNvPr id="7" name="Picture 6"/>
+          <p:cNvPr id="9" name="Picture 8"/>
           <p:cNvPicPr>
             <a:picLocks noChangeAspect="1"/>
           </p:cNvPicPr>
           <p:nvPr userDrawn="1"/>
         </p:nvPicPr>
         <p:blipFill>
-          <a:blip r:embed="rId13">
-            <a:extLst>
-              <a:ext uri="{28A0092B-C50C-407E-A947-70E740481C1C}">
-                <a14:useLocalDpi xmlns:a14="http://schemas.microsoft.com/office/drawing/2010/main" val="0"/>
-              </a:ext>
-            </a:extLst>
-          </a:blip>
+          <a:blip r:embed="rId13"/>
           <a:stretch>
             <a:fillRect/>
           </a:stretch>
         </p:blipFill>
         <p:spPr>
           <a:xfrm>
-            <a:off x="4240068" y="6356351"/>
-            <a:ext cx="663864" cy="365125"/>
+            <a:off x="4237102" y="6361370"/>
+            <a:ext cx="669795" cy="360105"/>
           </a:xfrm>
           <a:prstGeom prst="rect">
             <a:avLst/>
@@ -17733,7 +18192,7 @@
             <a:r>
               <a:rPr lang="en-US" sz="3200" dirty="0">
                 <a:solidFill>
-                  <a:schemeClr val="accent3"/>
+                  <a:schemeClr val="accent2"/>
                 </a:solidFill>
               </a:rPr>
               <a:t>(</a:t>
@@ -17741,7 +18200,7 @@
             <a:r>
               <a:rPr lang="en-US" sz="3200" i="1" dirty="0">
                 <a:solidFill>
-                  <a:schemeClr val="accent3"/>
+                  <a:schemeClr val="accent2"/>
                 </a:solidFill>
               </a:rPr>
               <a:t>and Write Better Software)</a:t>
@@ -17766,7 +18225,7 @@
           <a:p>
             <a:r>
               <a:rPr lang="en-US" dirty="0"/>
-              <a:t>Paulmichael Blasucci</a:t>
+              <a:t>Paul Blasucci</a:t>
             </a:r>
           </a:p>
           <a:p>
@@ -17774,7 +18233,7 @@
               <a:rPr lang="en-US" dirty="0">
                 <a:hlinkClick r:id="rId3"/>
               </a:rPr>
-              <a:t>paulmichael@jet.com</a:t>
+              <a:t>paul@statmuse.com</a:t>
             </a:r>
             <a:endParaRPr lang="en-US" dirty="0"/>
           </a:p>
@@ -17828,7 +18287,7 @@
             <a:r>
               <a:rPr lang="en-US" b="1" dirty="0">
                 <a:solidFill>
-                  <a:schemeClr val="accent3"/>
+                  <a:schemeClr val="accent5"/>
                 </a:solidFill>
               </a:rPr>
               <a:t>INPUT CONTROL</a:t>
@@ -18316,7 +18775,7 @@
           <a:lstStyle/>
           <a:p>
             <a:r>
-              <a:rPr lang="en-US" sz="1600" dirty="0">
+              <a:rPr lang="en-US" sz="1600" b="1" dirty="0">
                 <a:solidFill>
                   <a:schemeClr val="accent1"/>
                 </a:solidFill>
@@ -18343,7 +18802,7 @@
           <a:p>
             <a:r>
               <a:rPr lang="en-US"/>
-              <a:t>paulmichael@jet.com</a:t>
+              <a:t>paul@statmuse.com</a:t>
             </a:r>
             <a:endParaRPr lang="en-US" dirty="0"/>
           </a:p>
@@ -18756,7 +19215,7 @@
             <a:r>
               <a:rPr lang="en-US" b="1" dirty="0">
                 <a:solidFill>
-                  <a:schemeClr val="accent3"/>
+                  <a:schemeClr val="accent5"/>
                 </a:solidFill>
               </a:rPr>
               <a:t>DATA GENERATION</a:t>
@@ -18782,7 +19241,7 @@
           <a:lstStyle/>
           <a:p>
             <a:r>
-              <a:rPr lang="en-US" sz="1600" dirty="0">
+              <a:rPr lang="en-US" sz="1600" b="1" dirty="0">
                 <a:solidFill>
                   <a:schemeClr val="accent1"/>
                 </a:solidFill>
@@ -18790,14 +19249,14 @@
               <a:t>Arb with </a:t>
             </a:r>
             <a:r>
-              <a:rPr lang="en-US" sz="1600" dirty="0" err="1">
+              <a:rPr lang="en-US" sz="1600" b="1" dirty="0" err="1">
                 <a:solidFill>
                   <a:schemeClr val="accent1"/>
                 </a:solidFill>
               </a:rPr>
               <a:t>Shrinker</a:t>
             </a:r>
-            <a:endParaRPr lang="en-US" sz="1600" dirty="0">
+            <a:endParaRPr lang="en-US" sz="1600" b="1" dirty="0">
               <a:solidFill>
                 <a:schemeClr val="accent1"/>
               </a:solidFill>
@@ -18822,7 +19281,7 @@
           <a:p>
             <a:r>
               <a:rPr lang="en-US"/>
-              <a:t>paulmichael@jet.com</a:t>
+              <a:t>paul@statmuse.com</a:t>
             </a:r>
             <a:endParaRPr lang="en-US" dirty="0"/>
           </a:p>
@@ -19682,7 +20141,7 @@
           <a:p>
             <a:r>
               <a:rPr lang="en-US"/>
-              <a:t>paulmichael@jet.com</a:t>
+              <a:t>paul@statmuse.com</a:t>
             </a:r>
             <a:endParaRPr lang="en-US" dirty="0"/>
           </a:p>
@@ -20008,7 +20467,7 @@
           <a:p>
             <a:r>
               <a:rPr lang="en-US"/>
-              <a:t>paulmichael@jet.com</a:t>
+              <a:t>paul@statmuse.com</a:t>
             </a:r>
             <a:endParaRPr lang="en-US" dirty="0"/>
           </a:p>
@@ -20052,40 +20511,29 @@
           <a:prstGeom prst="roundRect">
             <a:avLst/>
           </a:prstGeom>
-          <a:solidFill>
-            <a:schemeClr val="accent3">
-              <a:lumMod val="20000"/>
-              <a:lumOff val="80000"/>
-            </a:schemeClr>
-          </a:solidFill>
-          <a:ln>
-            <a:noFill/>
+          <a:noFill/>
+          <a:ln w="9525" cap="flat" cmpd="sng" algn="ctr">
+            <a:solidFill>
+              <a:schemeClr val="accent2"/>
+            </a:solidFill>
+            <a:prstDash val="solid"/>
+            <a:round/>
+            <a:headEnd type="none" w="med" len="med"/>
+            <a:tailEnd type="none" w="med" len="med"/>
           </a:ln>
-          <a:effectLst/>
-          <a:scene3d>
-            <a:camera prst="orthographicFront">
-              <a:rot lat="0" lon="0" rev="0"/>
-            </a:camera>
-            <a:lightRig rig="contrasting" dir="t">
-              <a:rot lat="0" lon="0" rev="7800000"/>
-            </a:lightRig>
-          </a:scene3d>
-          <a:sp3d>
-            <a:bevelT w="139700" h="139700"/>
-          </a:sp3d>
         </p:spPr>
         <p:style>
-          <a:lnRef idx="2">
-            <a:schemeClr val="accent6"/>
+          <a:lnRef idx="0">
+            <a:scrgbClr r="0" g="0" b="0"/>
           </a:lnRef>
-          <a:fillRef idx="1">
-            <a:schemeClr val="lt1"/>
+          <a:fillRef idx="0">
+            <a:scrgbClr r="0" g="0" b="0"/>
           </a:fillRef>
           <a:effectRef idx="0">
-            <a:schemeClr val="accent6"/>
+            <a:scrgbClr r="0" g="0" b="0"/>
           </a:effectRef>
           <a:fontRef idx="minor">
-            <a:schemeClr val="dk1"/>
+            <a:schemeClr val="accent2"/>
           </a:fontRef>
         </p:style>
         <p:txBody>
@@ -20141,61 +20589,33 @@
               <a:t>    </a:t>
             </a:r>
             <a:r>
-              <a:rPr lang="en-US" sz="1400" i="1" dirty="0">
-                <a:solidFill>
-                  <a:schemeClr val="tx2"/>
-                </a:solidFill>
-              </a:rPr>
+              <a:rPr lang="en-US" sz="1400" i="1" dirty="0"/>
               <a:t>Falsifiable, after 4 tests (5 shrinks), (</a:t>
             </a:r>
             <a:r>
-              <a:rPr lang="en-US" sz="1400" i="1" dirty="0" err="1">
-                <a:solidFill>
-                  <a:schemeClr val="tx2"/>
-                </a:solidFill>
-              </a:rPr>
+              <a:rPr lang="en-US" sz="1400" i="1" dirty="0" err="1"/>
               <a:t>StdGen</a:t>
             </a:r>
             <a:r>
-              <a:rPr lang="en-US" sz="1400" i="1" dirty="0">
-                <a:solidFill>
-                  <a:schemeClr val="tx2"/>
-                </a:solidFill>
-              </a:rPr>
+              <a:rPr lang="en-US" sz="1400" i="1" dirty="0"/>
               <a:t> (199662269,296213481)):</a:t>
             </a:r>
           </a:p>
           <a:p>
-            <a:endParaRPr lang="en-US" sz="1400" i="1" dirty="0">
-              <a:solidFill>
-                <a:schemeClr val="tx2"/>
-              </a:solidFill>
-            </a:endParaRPr>
-          </a:p>
-          <a:p>
-            <a:r>
-              <a:rPr lang="en-US" sz="1400" i="1" dirty="0">
-                <a:solidFill>
-                  <a:schemeClr val="tx2"/>
-                </a:solidFill>
-              </a:rPr>
+            <a:endParaRPr lang="en-US" sz="1400" i="1" dirty="0"/>
+          </a:p>
+          <a:p>
+            <a:r>
+              <a:rPr lang="en-US" sz="1400" i="1" dirty="0"/>
               <a:t>        Original: (1948-04-19 16:18:52 +04:59, (UTC+04:00), (UTC-05:00))</a:t>
             </a:r>
           </a:p>
           <a:p>
             <a:r>
-              <a:rPr lang="en-US" sz="1400" i="1" dirty="0">
-                <a:solidFill>
-                  <a:schemeClr val="tx2"/>
-                </a:solidFill>
-              </a:rPr>
+              <a:rPr lang="en-US" sz="1400" i="1" dirty="0"/>
               <a:t>        Shrunk:   (1948-04-19 00:00:00 +00:00, (UTC+04:00), (UTC-05:00))</a:t>
             </a:r>
-            <a:endParaRPr lang="en-US" sz="1400" dirty="0">
-              <a:solidFill>
-                <a:schemeClr val="tx2"/>
-              </a:solidFill>
-            </a:endParaRPr>
+            <a:endParaRPr lang="en-US" sz="1400" dirty="0"/>
           </a:p>
         </p:txBody>
       </p:sp>
@@ -20734,7 +21154,7 @@
           <a:p>
             <a:r>
               <a:rPr lang="en-US"/>
-              <a:t>paulmichael@jet.com</a:t>
+              <a:t>paul@statmuse.com</a:t>
             </a:r>
             <a:endParaRPr lang="en-US" dirty="0"/>
           </a:p>
@@ -20778,40 +21198,29 @@
           <a:prstGeom prst="roundRect">
             <a:avLst/>
           </a:prstGeom>
-          <a:solidFill>
-            <a:schemeClr val="accent3">
-              <a:lumMod val="20000"/>
-              <a:lumOff val="80000"/>
-            </a:schemeClr>
-          </a:solidFill>
-          <a:ln>
-            <a:noFill/>
+          <a:noFill/>
+          <a:ln w="9525" cap="flat" cmpd="sng" algn="ctr">
+            <a:solidFill>
+              <a:schemeClr val="accent2"/>
+            </a:solidFill>
+            <a:prstDash val="solid"/>
+            <a:round/>
+            <a:headEnd type="none" w="med" len="med"/>
+            <a:tailEnd type="none" w="med" len="med"/>
           </a:ln>
-          <a:effectLst/>
-          <a:scene3d>
-            <a:camera prst="orthographicFront">
-              <a:rot lat="0" lon="0" rev="0"/>
-            </a:camera>
-            <a:lightRig rig="contrasting" dir="t">
-              <a:rot lat="0" lon="0" rev="7800000"/>
-            </a:lightRig>
-          </a:scene3d>
-          <a:sp3d>
-            <a:bevelT w="139700" h="139700"/>
-          </a:sp3d>
         </p:spPr>
         <p:style>
-          <a:lnRef idx="2">
-            <a:schemeClr val="accent6"/>
+          <a:lnRef idx="0">
+            <a:scrgbClr r="0" g="0" b="0"/>
           </a:lnRef>
-          <a:fillRef idx="1">
-            <a:schemeClr val="lt1"/>
+          <a:fillRef idx="0">
+            <a:scrgbClr r="0" g="0" b="0"/>
           </a:fillRef>
           <a:effectRef idx="0">
-            <a:schemeClr val="accent6"/>
+            <a:scrgbClr r="0" g="0" b="0"/>
           </a:effectRef>
           <a:fontRef idx="minor">
-            <a:schemeClr val="dk1"/>
+            <a:schemeClr val="accent2"/>
           </a:fontRef>
         </p:style>
         <p:txBody>
@@ -20867,79 +21276,43 @@
               <a:t>    </a:t>
             </a:r>
             <a:r>
-              <a:rPr lang="en-US" sz="1400" i="1" dirty="0">
-                <a:solidFill>
-                  <a:schemeClr val="tx2"/>
-                </a:solidFill>
-              </a:rPr>
+              <a:rPr lang="en-US" sz="1400" i="1" dirty="0"/>
               <a:t>Falsifiable, after 4 tests (5 shrinks), (</a:t>
             </a:r>
             <a:r>
-              <a:rPr lang="en-US" sz="1400" i="1" dirty="0" err="1">
-                <a:solidFill>
-                  <a:schemeClr val="tx2"/>
-                </a:solidFill>
-              </a:rPr>
+              <a:rPr lang="en-US" sz="1400" i="1" dirty="0" err="1"/>
               <a:t>StdGen</a:t>
             </a:r>
             <a:r>
-              <a:rPr lang="en-US" sz="1400" i="1" dirty="0">
-                <a:solidFill>
-                  <a:schemeClr val="tx2"/>
-                </a:solidFill>
-              </a:rPr>
+              <a:rPr lang="en-US" sz="1400" i="1" dirty="0"/>
               <a:t> (199662269,296213481)):</a:t>
             </a:r>
           </a:p>
           <a:p>
-            <a:endParaRPr lang="en-US" sz="1400" i="1" dirty="0">
-              <a:solidFill>
-                <a:schemeClr val="tx2"/>
-              </a:solidFill>
-            </a:endParaRPr>
-          </a:p>
-          <a:p>
-            <a:r>
-              <a:rPr lang="en-US" sz="1400" i="1" dirty="0">
-                <a:solidFill>
-                  <a:schemeClr val="tx2"/>
-                </a:solidFill>
-              </a:rPr>
+            <a:endParaRPr lang="en-US" sz="1400" i="1" dirty="0"/>
+          </a:p>
+          <a:p>
+            <a:r>
+              <a:rPr lang="en-US" sz="1400" i="1" dirty="0"/>
               <a:t>        </a:t>
             </a:r>
             <a:r>
-              <a:rPr lang="en-US" sz="1400" b="1" i="1" dirty="0">
-                <a:solidFill>
-                  <a:schemeClr val="tx2"/>
-                </a:solidFill>
-              </a:rPr>
+              <a:rPr lang="en-US" sz="1400" b="1" i="1" dirty="0"/>
               <a:t>Label of failing property: Not the same zone!</a:t>
             </a:r>
           </a:p>
           <a:p>
             <a:r>
-              <a:rPr lang="en-US" sz="1400" i="1" dirty="0">
-                <a:solidFill>
-                  <a:schemeClr val="tx2"/>
-                </a:solidFill>
-              </a:rPr>
+              <a:rPr lang="en-US" sz="1400" i="1" dirty="0"/>
               <a:t>        Original: (1948-04-19 16:18:52 +04:59, (UTC+04:00), (UTC-05:00))</a:t>
             </a:r>
           </a:p>
           <a:p>
             <a:r>
-              <a:rPr lang="en-US" sz="1400" i="1" dirty="0">
-                <a:solidFill>
-                  <a:schemeClr val="tx2"/>
-                </a:solidFill>
-              </a:rPr>
+              <a:rPr lang="en-US" sz="1400" i="1" dirty="0"/>
               <a:t>        Shrunk:   (1948-04-19 00:00:00 +00:00, (UTC+04:00), (UTC-05:00))</a:t>
             </a:r>
-            <a:endParaRPr lang="en-US" sz="1400" dirty="0">
-              <a:solidFill>
-                <a:schemeClr val="tx2"/>
-              </a:solidFill>
-            </a:endParaRPr>
+            <a:endParaRPr lang="en-US" sz="1400" dirty="0"/>
           </a:p>
         </p:txBody>
       </p:sp>
@@ -21762,7 +22135,7 @@
           <a:p>
             <a:r>
               <a:rPr lang="en-US"/>
-              <a:t>paulmichael@jet.com</a:t>
+              <a:t>paul@statmuse.com</a:t>
             </a:r>
             <a:endParaRPr lang="en-US" dirty="0"/>
           </a:p>
@@ -21806,40 +22179,29 @@
           <a:prstGeom prst="roundRect">
             <a:avLst/>
           </a:prstGeom>
-          <a:solidFill>
-            <a:schemeClr val="accent3">
-              <a:lumMod val="20000"/>
-              <a:lumOff val="80000"/>
-            </a:schemeClr>
-          </a:solidFill>
-          <a:ln>
-            <a:noFill/>
+          <a:noFill/>
+          <a:ln w="9525" cap="flat" cmpd="sng" algn="ctr">
+            <a:solidFill>
+              <a:schemeClr val="accent2"/>
+            </a:solidFill>
+            <a:prstDash val="solid"/>
+            <a:round/>
+            <a:headEnd type="none" w="med" len="med"/>
+            <a:tailEnd type="none" w="med" len="med"/>
           </a:ln>
-          <a:effectLst/>
-          <a:scene3d>
-            <a:camera prst="orthographicFront">
-              <a:rot lat="0" lon="0" rev="0"/>
-            </a:camera>
-            <a:lightRig rig="contrasting" dir="t">
-              <a:rot lat="0" lon="0" rev="7800000"/>
-            </a:lightRig>
-          </a:scene3d>
-          <a:sp3d>
-            <a:bevelT w="139700" h="139700"/>
-          </a:sp3d>
         </p:spPr>
         <p:style>
-          <a:lnRef idx="2">
-            <a:schemeClr val="accent6"/>
+          <a:lnRef idx="0">
+            <a:scrgbClr r="0" g="0" b="0"/>
           </a:lnRef>
-          <a:fillRef idx="1">
-            <a:schemeClr val="lt1"/>
+          <a:fillRef idx="0">
+            <a:scrgbClr r="0" g="0" b="0"/>
           </a:fillRef>
           <a:effectRef idx="0">
-            <a:schemeClr val="accent6"/>
+            <a:scrgbClr r="0" g="0" b="0"/>
           </a:effectRef>
           <a:fontRef idx="minor">
-            <a:schemeClr val="dk1"/>
+            <a:schemeClr val="accent2"/>
           </a:fontRef>
         </p:style>
         <p:txBody>
@@ -22387,7 +22749,7 @@
             <a:r>
               <a:rPr lang="en-US" b="1" dirty="0">
                 <a:solidFill>
-                  <a:schemeClr val="accent3"/>
+                  <a:schemeClr val="accent5"/>
                 </a:solidFill>
               </a:rPr>
               <a:t>DIAGNOSTICS</a:t>
@@ -22440,7 +22802,7 @@
           <a:p>
             <a:r>
               <a:rPr lang="en-US"/>
-              <a:t>paulmichael@jet.com</a:t>
+              <a:t>paul@statmuse.com</a:t>
             </a:r>
             <a:endParaRPr lang="en-US" dirty="0"/>
           </a:p>
@@ -22484,40 +22846,29 @@
           <a:prstGeom prst="roundRect">
             <a:avLst/>
           </a:prstGeom>
-          <a:solidFill>
-            <a:schemeClr val="accent3">
-              <a:lumMod val="20000"/>
-              <a:lumOff val="80000"/>
-            </a:schemeClr>
-          </a:solidFill>
-          <a:ln>
-            <a:noFill/>
+          <a:noFill/>
+          <a:ln w="9525" cap="flat" cmpd="sng" algn="ctr">
+            <a:solidFill>
+              <a:schemeClr val="accent2"/>
+            </a:solidFill>
+            <a:prstDash val="solid"/>
+            <a:round/>
+            <a:headEnd type="none" w="med" len="med"/>
+            <a:tailEnd type="none" w="med" len="med"/>
           </a:ln>
-          <a:effectLst/>
-          <a:scene3d>
-            <a:camera prst="orthographicFront">
-              <a:rot lat="0" lon="0" rev="0"/>
-            </a:camera>
-            <a:lightRig rig="contrasting" dir="t">
-              <a:rot lat="0" lon="0" rev="7800000"/>
-            </a:lightRig>
-          </a:scene3d>
-          <a:sp3d>
-            <a:bevelT w="139700" h="139700"/>
-          </a:sp3d>
         </p:spPr>
         <p:style>
-          <a:lnRef idx="2">
-            <a:schemeClr val="accent6"/>
+          <a:lnRef idx="0">
+            <a:scrgbClr r="0" g="0" b="0"/>
           </a:lnRef>
-          <a:fillRef idx="1">
-            <a:schemeClr val="lt1"/>
+          <a:fillRef idx="0">
+            <a:scrgbClr r="0" g="0" b="0"/>
           </a:fillRef>
           <a:effectRef idx="0">
-            <a:schemeClr val="accent6"/>
+            <a:scrgbClr r="0" g="0" b="0"/>
           </a:effectRef>
           <a:fontRef idx="minor">
-            <a:schemeClr val="dk1"/>
+            <a:schemeClr val="accent2"/>
           </a:fontRef>
         </p:style>
         <p:txBody>
@@ -23176,7 +23527,7 @@
           <a:p>
             <a:r>
               <a:rPr lang="en-US"/>
-              <a:t>paulmichael@jet.com</a:t>
+              <a:t>paul@statmuse.com</a:t>
             </a:r>
             <a:endParaRPr lang="en-US" dirty="0"/>
           </a:p>
@@ -23862,7 +24213,7 @@
           <a:p>
             <a:r>
               <a:rPr lang="en-US"/>
-              <a:t>paulmichael@jet.com</a:t>
+              <a:t>paul@statmuse.com</a:t>
             </a:r>
             <a:endParaRPr lang="en-US" dirty="0"/>
           </a:p>
@@ -24514,7 +24865,7 @@
           <a:p>
             <a:r>
               <a:rPr lang="en-US"/>
-              <a:t>paulmichael@jet.com</a:t>
+              <a:t>paul@statmuse.com</a:t>
             </a:r>
             <a:endParaRPr lang="en-US" dirty="0"/>
           </a:p>
@@ -24659,7 +25010,7 @@
             <a:r>
               <a:rPr lang="en-US" sz="2400" b="1" dirty="0">
                 <a:solidFill>
-                  <a:schemeClr val="accent3"/>
+                  <a:schemeClr val="accent1"/>
                 </a:solidFill>
               </a:rPr>
               <a:t>RANDOM TESTING</a:t>
@@ -24685,7 +25036,7 @@
             <a:r>
               <a:rPr lang="en-US" sz="2800" b="1" dirty="0">
                 <a:solidFill>
-                  <a:schemeClr val="accent1"/>
+                  <a:schemeClr val="accent2"/>
                 </a:solidFill>
               </a:rPr>
               <a:t>functions</a:t>
@@ -24701,7 +25052,7 @@
             <a:r>
               <a:rPr lang="en-US" sz="2800" b="1" dirty="0">
                 <a:solidFill>
-                  <a:schemeClr val="accent1"/>
+                  <a:schemeClr val="accent2"/>
                 </a:solidFill>
               </a:rPr>
               <a:t>automatically tested on random input</a:t>
@@ -24739,7 +25090,7 @@
             <a:r>
               <a:rPr lang="en-US" sz="2000" i="1" dirty="0">
                 <a:solidFill>
-                  <a:schemeClr val="accent3"/>
+                  <a:schemeClr val="accent5"/>
                 </a:solidFill>
               </a:rPr>
               <a:t>from</a:t>
@@ -24804,7 +25155,7 @@
           <a:p>
             <a:r>
               <a:rPr lang="en-US"/>
-              <a:t>paulmichael@jet.com</a:t>
+              <a:t>paul@statmuse.com</a:t>
             </a:r>
             <a:endParaRPr lang="en-US" dirty="0"/>
           </a:p>
@@ -25790,7 +26141,7 @@
           <a:p>
             <a:r>
               <a:rPr lang="en-US"/>
-              <a:t>paulmichael@jet.com</a:t>
+              <a:t>paul@statmuse.com</a:t>
             </a:r>
             <a:endParaRPr lang="en-US" dirty="0"/>
           </a:p>
@@ -25935,7 +26286,7 @@
             <a:r>
               <a:rPr lang="en-US" sz="2400" b="1" dirty="0">
                 <a:solidFill>
-                  <a:schemeClr val="accent3"/>
+                  <a:schemeClr val="accent1"/>
                 </a:solidFill>
               </a:rPr>
               <a:t>RANDOM TESTING</a:t>
@@ -25965,7 +26316,7 @@
             <a:r>
               <a:rPr lang="en-US" sz="2800" b="1" dirty="0">
                 <a:solidFill>
-                  <a:schemeClr val="accent1"/>
+                  <a:schemeClr val="accent2"/>
                 </a:solidFill>
               </a:rPr>
               <a:t>encourages</a:t>
@@ -25977,19 +26328,27 @@
             <a:r>
               <a:rPr lang="en-US" sz="2800" b="1" dirty="0">
                 <a:solidFill>
-                  <a:schemeClr val="accent1"/>
+                  <a:schemeClr val="accent2"/>
                 </a:solidFill>
               </a:rPr>
               <a:t>formal specifications, thus improving</a:t>
             </a:r>
             <a:r>
+              <a:rPr lang="en-US" sz="2800" dirty="0">
+                <a:solidFill>
+                  <a:schemeClr val="accent2"/>
+                </a:solidFill>
+              </a:rPr>
+              <a:t> </a:t>
+            </a:r>
+            <a:r>
               <a:rPr lang="en-US" sz="2800" dirty="0"/>
-              <a:t> our </a:t>
+              <a:t>our </a:t>
             </a:r>
             <a:r>
               <a:rPr lang="en-US" sz="2800" b="1" dirty="0">
                 <a:solidFill>
-                  <a:schemeClr val="accent1"/>
+                  <a:schemeClr val="accent2"/>
                 </a:solidFill>
               </a:rPr>
               <a:t>understanding</a:t>
@@ -26035,41 +26394,33 @@
             <a:r>
               <a:rPr lang="en-US" sz="2000" i="1" dirty="0">
                 <a:solidFill>
-                  <a:schemeClr val="accent3"/>
-                </a:solidFill>
-              </a:rPr>
-              <a:t>from</a:t>
+                  <a:schemeClr val="accent5"/>
+                </a:solidFill>
+              </a:rPr>
+              <a:t>from </a:t>
             </a:r>
             <a:r>
               <a:rPr lang="en-US" sz="2000" i="1" dirty="0">
                 <a:solidFill>
-                  <a:schemeClr val="accent2"/>
-                </a:solidFill>
-              </a:rPr>
-              <a:t> </a:t>
+                  <a:schemeClr val="accent5"/>
+                </a:solidFill>
+                <a:hlinkClick r:id="rId3" tooltip="Extensible Pattern Matching Via a Lightweight Language Extension"/>
+              </a:rPr>
+              <a:t>ICFP’00 – </a:t>
+            </a:r>
+            <a:r>
+              <a:rPr lang="en-US" sz="2000" i="1" dirty="0" err="1">
+                <a:solidFill>
+                  <a:schemeClr val="accent5"/>
+                </a:solidFill>
+                <a:hlinkClick r:id="rId3" tooltip="Extensible Pattern Matching Via a Lightweight Language Extension"/>
+              </a:rPr>
+              <a:t>Claessen</a:t>
             </a:r>
             <a:r>
               <a:rPr lang="en-US" sz="2000" i="1" dirty="0">
                 <a:solidFill>
-                  <a:schemeClr val="accent2"/>
-                </a:solidFill>
-                <a:hlinkClick r:id="rId3" tooltip="Extensible Pattern Matching Via a Lightweight Language Extension"/>
-              </a:rPr>
-              <a:t>ICFP’00 – </a:t>
-            </a:r>
-            <a:r>
-              <a:rPr lang="en-US" sz="2000" i="1" dirty="0" err="1">
-                <a:solidFill>
-                  <a:schemeClr val="accent2"/>
-                </a:solidFill>
-                <a:hlinkClick r:id="rId3" tooltip="Extensible Pattern Matching Via a Lightweight Language Extension"/>
-              </a:rPr>
-              <a:t>Claessen</a:t>
-            </a:r>
-            <a:r>
-              <a:rPr lang="en-US" sz="2000" i="1" dirty="0">
-                <a:solidFill>
-                  <a:schemeClr val="accent2"/>
+                  <a:schemeClr val="accent5"/>
                 </a:solidFill>
                 <a:hlinkClick r:id="rId3" tooltip="Extensible Pattern Matching Via a Lightweight Language Extension"/>
               </a:rPr>
@@ -26077,7 +26428,7 @@
             </a:r>
             <a:endParaRPr lang="en-US" sz="2000" i="1" dirty="0">
               <a:solidFill>
-                <a:schemeClr val="accent2"/>
+                <a:schemeClr val="accent5"/>
               </a:solidFill>
             </a:endParaRPr>
           </a:p>
@@ -26100,7 +26451,7 @@
           <a:p>
             <a:r>
               <a:rPr lang="en-US"/>
-              <a:t>paulmichael@jet.com</a:t>
+              <a:t>paul@statmuse.com</a:t>
             </a:r>
             <a:endParaRPr lang="en-US" dirty="0"/>
           </a:p>
@@ -26195,7 +26546,7 @@
             <a:r>
               <a:rPr lang="en-US" sz="1600" dirty="0">
                 <a:solidFill>
-                  <a:schemeClr val="accent3"/>
+                  <a:schemeClr val="accent5"/>
                 </a:solidFill>
               </a:rPr>
               <a:t>About F# and </a:t>
@@ -26203,14 +26554,14 @@
             <a:r>
               <a:rPr lang="en-US" sz="1600" dirty="0" err="1">
                 <a:solidFill>
-                  <a:schemeClr val="accent3"/>
+                  <a:schemeClr val="accent5"/>
                 </a:solidFill>
               </a:rPr>
               <a:t>FsCheck</a:t>
             </a:r>
             <a:endParaRPr lang="en-US" sz="1600" dirty="0">
               <a:solidFill>
-                <a:schemeClr val="accent3"/>
+                <a:schemeClr val="accent5"/>
               </a:solidFill>
             </a:endParaRPr>
           </a:p>
@@ -26315,17 +26666,8 @@
               <a:rPr lang="en-US" sz="1800" dirty="0">
                 <a:hlinkClick r:id="rId6"/>
               </a:rPr>
-              <a:t>meetup.com/</a:t>
-            </a:r>
-            <a:r>
-              <a:rPr lang="en-US" sz="1800" dirty="0" err="1">
-                <a:hlinkClick r:id="rId6"/>
-              </a:rPr>
-              <a:t>nyc-fsharp</a:t>
-            </a:r>
-            <a:endParaRPr lang="en-US" sz="1800" dirty="0"/>
-          </a:p>
-          <a:p>
+              <a:t>www.fssnip.net</a:t>
+            </a:r>
             <a:endParaRPr lang="en-US" sz="1800" dirty="0"/>
           </a:p>
         </p:txBody>
@@ -26355,7 +26697,7 @@
             <a:r>
               <a:rPr lang="en-US" sz="1600" dirty="0">
                 <a:solidFill>
-                  <a:schemeClr val="accent3"/>
+                  <a:schemeClr val="accent5"/>
                 </a:solidFill>
               </a:rPr>
               <a:t>About Paulmichael Blasucci</a:t>
@@ -26449,13 +26791,7 @@
               <a:rPr lang="en-US" sz="1800" dirty="0">
                 <a:hlinkClick r:id="rId9"/>
               </a:rPr>
-              <a:t>gitlab.com/</a:t>
-            </a:r>
-            <a:r>
-              <a:rPr lang="en-US" sz="1800" dirty="0" err="1">
-                <a:hlinkClick r:id="rId9"/>
-              </a:rPr>
-              <a:t>pblasucci</a:t>
+              <a:t>pblasucci.wordpress.com</a:t>
             </a:r>
             <a:endParaRPr lang="en-US" sz="1800" dirty="0"/>
           </a:p>
@@ -26503,7 +26839,7 @@
           <a:p>
             <a:r>
               <a:rPr lang="en-US"/>
-              <a:t>paulmichael@jet.com</a:t>
+              <a:t>paul@statmuse.com</a:t>
             </a:r>
             <a:endParaRPr lang="en-US" dirty="0"/>
           </a:p>
@@ -26723,7 +27059,7 @@
           <a:p>
             <a:r>
               <a:rPr lang="en-US"/>
-              <a:t>paulmichael@jet.com</a:t>
+              <a:t>paul@statmuse.com</a:t>
             </a:r>
             <a:endParaRPr lang="en-US" dirty="0"/>
           </a:p>
@@ -27194,7 +27530,7 @@
         </p:spPr>
         <p:txBody>
           <a:bodyPr>
-            <a:normAutofit/>
+            <a:noAutofit/>
           </a:bodyPr>
           <a:lstStyle/>
           <a:p>
@@ -27621,7 +27957,7 @@
           <a:p>
             <a:r>
               <a:rPr lang="en-US"/>
-              <a:t>paulmichael@jet.com</a:t>
+              <a:t>paul@statmuse.com</a:t>
             </a:r>
             <a:endParaRPr lang="en-US" dirty="0"/>
           </a:p>
@@ -27743,40 +28079,29 @@
           <a:prstGeom prst="roundRect">
             <a:avLst/>
           </a:prstGeom>
-          <a:solidFill>
-            <a:schemeClr val="accent3">
-              <a:lumMod val="20000"/>
-              <a:lumOff val="80000"/>
-            </a:schemeClr>
-          </a:solidFill>
-          <a:ln>
-            <a:noFill/>
+          <a:noFill/>
+          <a:ln w="9525" cap="flat" cmpd="sng" algn="ctr">
+            <a:solidFill>
+              <a:schemeClr val="accent2"/>
+            </a:solidFill>
+            <a:prstDash val="solid"/>
+            <a:round/>
+            <a:headEnd type="none" w="med" len="med"/>
+            <a:tailEnd type="none" w="med" len="med"/>
           </a:ln>
-          <a:effectLst/>
-          <a:scene3d>
-            <a:camera prst="orthographicFront">
-              <a:rot lat="0" lon="0" rev="0"/>
-            </a:camera>
-            <a:lightRig rig="contrasting" dir="t">
-              <a:rot lat="0" lon="0" rev="7800000"/>
-            </a:lightRig>
-          </a:scene3d>
-          <a:sp3d>
-            <a:bevelT w="139700" h="139700"/>
-          </a:sp3d>
         </p:spPr>
         <p:style>
-          <a:lnRef idx="2">
-            <a:schemeClr val="accent6"/>
+          <a:lnRef idx="0">
+            <a:scrgbClr r="0" g="0" b="0"/>
           </a:lnRef>
-          <a:fillRef idx="1">
-            <a:schemeClr val="lt1"/>
+          <a:fillRef idx="0">
+            <a:scrgbClr r="0" g="0" b="0"/>
           </a:fillRef>
           <a:effectRef idx="0">
-            <a:schemeClr val="accent6"/>
+            <a:scrgbClr r="0" g="0" b="0"/>
           </a:effectRef>
           <a:fontRef idx="minor">
-            <a:schemeClr val="dk1"/>
+            <a:schemeClr val="accent2"/>
           </a:fontRef>
         </p:style>
         <p:txBody>
@@ -27855,40 +28180,29 @@
           <a:prstGeom prst="roundRect">
             <a:avLst/>
           </a:prstGeom>
-          <a:solidFill>
-            <a:schemeClr val="accent3">
-              <a:lumMod val="20000"/>
-              <a:lumOff val="80000"/>
-            </a:schemeClr>
-          </a:solidFill>
-          <a:ln>
-            <a:noFill/>
+          <a:noFill/>
+          <a:ln w="9525" cap="flat" cmpd="sng" algn="ctr">
+            <a:solidFill>
+              <a:schemeClr val="accent2"/>
+            </a:solidFill>
+            <a:prstDash val="solid"/>
+            <a:round/>
+            <a:headEnd type="none" w="med" len="med"/>
+            <a:tailEnd type="none" w="med" len="med"/>
           </a:ln>
-          <a:effectLst/>
-          <a:scene3d>
-            <a:camera prst="orthographicFront">
-              <a:rot lat="0" lon="0" rev="0"/>
-            </a:camera>
-            <a:lightRig rig="contrasting" dir="t">
-              <a:rot lat="0" lon="0" rev="7800000"/>
-            </a:lightRig>
-          </a:scene3d>
-          <a:sp3d>
-            <a:bevelT w="139700" h="139700"/>
-          </a:sp3d>
         </p:spPr>
         <p:style>
-          <a:lnRef idx="3">
-            <a:schemeClr val="accent6"/>
+          <a:lnRef idx="0">
+            <a:scrgbClr r="0" g="0" b="0"/>
           </a:lnRef>
           <a:fillRef idx="0">
-            <a:schemeClr val="accent6"/>
+            <a:scrgbClr r="0" g="0" b="0"/>
           </a:fillRef>
-          <a:effectRef idx="2">
-            <a:schemeClr val="accent6"/>
+          <a:effectRef idx="0">
+            <a:scrgbClr r="0" g="0" b="0"/>
           </a:effectRef>
           <a:fontRef idx="minor">
-            <a:schemeClr val="tx1"/>
+            <a:schemeClr val="accent2"/>
           </a:fontRef>
         </p:style>
         <p:txBody>
@@ -28622,7 +28936,7 @@
                   <a:schemeClr val="accent1"/>
                 </a:solidFill>
               </a:rPr>
-              <a:t>PATTERNS: INVERSION &amp; IDEMPOTENCEY</a:t>
+              <a:t>PATTERNS: INVERSION &amp; IDEMPOTENCE</a:t>
             </a:r>
           </a:p>
         </p:txBody>
@@ -29068,7 +29382,7 @@
           <a:p>
             <a:r>
               <a:rPr lang="en-US"/>
-              <a:t>paulmichael@jet.com</a:t>
+              <a:t>paul@statmuse.com</a:t>
             </a:r>
             <a:endParaRPr lang="en-US" dirty="0"/>
           </a:p>
@@ -29168,7 +29482,7 @@
                   <a:schemeClr val="accent1"/>
                 </a:solidFill>
               </a:rPr>
-              <a:t>PATTERNS: INVARIANCE &amp; INTERCHANGE</a:t>
+              <a:t>PATTERNS: INTERCHANGE &amp; INVARIANCE</a:t>
             </a:r>
           </a:p>
         </p:txBody>
@@ -29329,7 +29643,7 @@
             </a:r>
             <a:r>
               <a:rPr lang="en-US" sz="1200" dirty="0"/>
-              <a:t> = </a:t>
+              <a:t>       = </a:t>
             </a:r>
             <a:r>
               <a:rPr lang="en-US" sz="1200" dirty="0">
@@ -29354,7 +29668,7 @@
             </a:r>
             <a:r>
               <a:rPr lang="en-US" sz="1200" dirty="0"/>
-              <a:t> days   = </a:t>
+              <a:t> days         = </a:t>
             </a:r>
             <a:r>
               <a:rPr lang="en-US" sz="1200" dirty="0" err="1">
@@ -29755,7 +30069,7 @@
           <a:p>
             <a:r>
               <a:rPr lang="en-US"/>
-              <a:t>paulmichael@jet.com</a:t>
+              <a:t>paul@statmuse.com</a:t>
             </a:r>
             <a:endParaRPr lang="en-US" dirty="0"/>
           </a:p>
@@ -29836,7 +30150,7 @@
             <a:r>
               <a:rPr lang="en-US" b="1" dirty="0">
                 <a:solidFill>
-                  <a:schemeClr val="accent3"/>
+                  <a:schemeClr val="accent5"/>
                 </a:solidFill>
               </a:rPr>
               <a:t>INPUT CONTROL</a:t>
@@ -30097,7 +30411,7 @@
           <a:lstStyle/>
           <a:p>
             <a:r>
-              <a:rPr lang="en-US" sz="1600" dirty="0">
+              <a:rPr lang="en-US" sz="1600" b="1" dirty="0">
                 <a:solidFill>
                   <a:schemeClr val="accent1"/>
                 </a:solidFill>
@@ -30124,7 +30438,7 @@
           <a:p>
             <a:r>
               <a:rPr lang="en-US"/>
-              <a:t>paulmichael@jet.com</a:t>
+              <a:t>paul@statmuse.com</a:t>
             </a:r>
             <a:endParaRPr lang="en-US" dirty="0"/>
           </a:p>
@@ -30168,40 +30482,29 @@
           <a:prstGeom prst="roundRect">
             <a:avLst/>
           </a:prstGeom>
-          <a:solidFill>
-            <a:schemeClr val="accent3">
-              <a:lumMod val="20000"/>
-              <a:lumOff val="80000"/>
-            </a:schemeClr>
-          </a:solidFill>
-          <a:ln>
-            <a:noFill/>
+          <a:noFill/>
+          <a:ln w="9525" cap="flat" cmpd="sng" algn="ctr">
+            <a:solidFill>
+              <a:schemeClr val="accent2"/>
+            </a:solidFill>
+            <a:prstDash val="solid"/>
+            <a:round/>
+            <a:headEnd type="none" w="med" len="med"/>
+            <a:tailEnd type="none" w="med" len="med"/>
           </a:ln>
-          <a:effectLst/>
-          <a:scene3d>
-            <a:camera prst="orthographicFront">
-              <a:rot lat="0" lon="0" rev="0"/>
-            </a:camera>
-            <a:lightRig rig="contrasting" dir="t">
-              <a:rot lat="0" lon="0" rev="7800000"/>
-            </a:lightRig>
-          </a:scene3d>
-          <a:sp3d>
-            <a:bevelT w="139700" h="139700"/>
-          </a:sp3d>
         </p:spPr>
         <p:style>
-          <a:lnRef idx="2">
-            <a:schemeClr val="accent6"/>
+          <a:lnRef idx="0">
+            <a:scrgbClr r="0" g="0" b="0"/>
           </a:lnRef>
-          <a:fillRef idx="1">
-            <a:schemeClr val="lt1"/>
+          <a:fillRef idx="0">
+            <a:scrgbClr r="0" g="0" b="0"/>
           </a:fillRef>
           <a:effectRef idx="0">
-            <a:schemeClr val="accent6"/>
+            <a:scrgbClr r="0" g="0" b="0"/>
           </a:effectRef>
           <a:fontRef idx="minor">
-            <a:schemeClr val="dk1"/>
+            <a:schemeClr val="accent2"/>
           </a:fontRef>
         </p:style>
         <p:txBody>
@@ -30476,7 +30779,7 @@
             <a:r>
               <a:rPr lang="en-US" b="1" dirty="0">
                 <a:solidFill>
-                  <a:schemeClr val="accent3"/>
+                  <a:schemeClr val="accent5"/>
                 </a:solidFill>
               </a:rPr>
               <a:t>INPUT CONTROL</a:t>
@@ -30765,7 +31068,7 @@
           <a:lstStyle/>
           <a:p>
             <a:r>
-              <a:rPr lang="en-US" sz="1600" dirty="0">
+              <a:rPr lang="en-US" sz="1600" b="1" dirty="0">
                 <a:solidFill>
                   <a:schemeClr val="accent1"/>
                 </a:solidFill>
@@ -30792,7 +31095,7 @@
           <a:p>
             <a:r>
               <a:rPr lang="en-US"/>
-              <a:t>paulmichael@jet.com</a:t>
+              <a:t>paul@statmuse.com</a:t>
             </a:r>
             <a:endParaRPr lang="en-US" dirty="0"/>
           </a:p>
@@ -30836,40 +31139,29 @@
           <a:prstGeom prst="roundRect">
             <a:avLst/>
           </a:prstGeom>
-          <a:solidFill>
-            <a:schemeClr val="accent3">
-              <a:lumMod val="20000"/>
-              <a:lumOff val="80000"/>
-            </a:schemeClr>
-          </a:solidFill>
-          <a:ln>
-            <a:noFill/>
+          <a:noFill/>
+          <a:ln w="9525" cap="flat" cmpd="sng" algn="ctr">
+            <a:solidFill>
+              <a:schemeClr val="accent2"/>
+            </a:solidFill>
+            <a:prstDash val="solid"/>
+            <a:round/>
+            <a:headEnd type="none" w="med" len="med"/>
+            <a:tailEnd type="none" w="med" len="med"/>
           </a:ln>
-          <a:effectLst/>
-          <a:scene3d>
-            <a:camera prst="orthographicFront">
-              <a:rot lat="0" lon="0" rev="0"/>
-            </a:camera>
-            <a:lightRig rig="contrasting" dir="t">
-              <a:rot lat="0" lon="0" rev="7800000"/>
-            </a:lightRig>
-          </a:scene3d>
-          <a:sp3d>
-            <a:bevelT w="139700" h="139700"/>
-          </a:sp3d>
         </p:spPr>
         <p:style>
-          <a:lnRef idx="2">
-            <a:schemeClr val="accent6"/>
+          <a:lnRef idx="0">
+            <a:scrgbClr r="0" g="0" b="0"/>
           </a:lnRef>
-          <a:fillRef idx="1">
-            <a:schemeClr val="lt1"/>
+          <a:fillRef idx="0">
+            <a:scrgbClr r="0" g="0" b="0"/>
           </a:fillRef>
           <a:effectRef idx="0">
-            <a:schemeClr val="accent6"/>
+            <a:scrgbClr r="0" g="0" b="0"/>
           </a:effectRef>
           <a:fontRef idx="minor">
-            <a:schemeClr val="dk1"/>
+            <a:schemeClr val="accent2"/>
           </a:fontRef>
         </p:style>
         <p:txBody>
@@ -31367,7 +31659,7 @@
           <a:p>
             <a:r>
               <a:rPr lang="en-US"/>
-              <a:t>paulmichael@jet.com</a:t>
+              <a:t>paul@statmuse.com</a:t>
             </a:r>
             <a:endParaRPr lang="en-US" dirty="0"/>
           </a:p>
@@ -31407,7 +31699,7 @@
             <p:ph idx="1"/>
             <p:extLst>
               <p:ext uri="{D42A27DB-BD31-4B8C-83A1-F6EECF244321}">
-                <p14:modId xmlns:p14="http://schemas.microsoft.com/office/powerpoint/2010/main" val="2410509471"/>
+                <p14:modId xmlns:p14="http://schemas.microsoft.com/office/powerpoint/2010/main" val="348959730"/>
               </p:ext>
             </p:extLst>
           </p:nvPr>
@@ -31813,7 +32105,7 @@
             <p:ph idx="1"/>
             <p:extLst>
               <p:ext uri="{D42A27DB-BD31-4B8C-83A1-F6EECF244321}">
-                <p14:modId xmlns:p14="http://schemas.microsoft.com/office/powerpoint/2010/main" val="1524928907"/>
+                <p14:modId xmlns:p14="http://schemas.microsoft.com/office/powerpoint/2010/main" val="3805744802"/>
               </p:ext>
             </p:extLst>
           </p:nvPr>
@@ -31845,7 +32137,7 @@
           <a:p>
             <a:r>
               <a:rPr lang="en-US"/>
-              <a:t>paulmichael@jet.com</a:t>
+              <a:t>paul@statmuse.com</a:t>
             </a:r>
             <a:endParaRPr lang="en-US" dirty="0"/>
           </a:p>
@@ -31882,7 +32174,7 @@
           <p:nvPr>
             <p:extLst>
               <p:ext uri="{D42A27DB-BD31-4B8C-83A1-F6EECF244321}">
-                <p14:modId xmlns:p14="http://schemas.microsoft.com/office/powerpoint/2010/main" val="4151008294"/>
+                <p14:modId xmlns:p14="http://schemas.microsoft.com/office/powerpoint/2010/main" val="2613033402"/>
               </p:ext>
             </p:extLst>
           </p:nvPr>
@@ -32843,42 +33135,42 @@
 <file path=ppt/theme/theme1.xml><?xml version="1.0" encoding="utf-8"?>
 <a:theme xmlns:a="http://schemas.openxmlformats.org/drawingml/2006/main" name="Office Theme">
   <a:themeElements>
-    <a:clrScheme name="Jetty">
+    <a:clrScheme name="Custom 2">
       <a:dk1>
-        <a:srgbClr val="300047"/>
+        <a:srgbClr val="000000"/>
       </a:dk1>
       <a:lt1>
-        <a:sysClr val="window" lastClr="FFFFFF"/>
+        <a:srgbClr val="FFFFFF"/>
       </a:lt1>
       <a:dk2>
-        <a:srgbClr val="333333"/>
+        <a:srgbClr val="000000"/>
       </a:dk2>
       <a:lt2>
-        <a:srgbClr val="F7F7F7"/>
+        <a:srgbClr val="FFFFFF"/>
       </a:lt2>
       <a:accent1>
-        <a:srgbClr val="8200FF"/>
+        <a:srgbClr val="39CCCC"/>
       </a:accent1>
       <a:accent2>
-        <a:srgbClr val="00CCFF"/>
+        <a:srgbClr val="0074D9"/>
       </a:accent2>
       <a:accent3>
-        <a:srgbClr val="999999"/>
+        <a:srgbClr val="7FDBFF"/>
       </a:accent3>
       <a:accent4>
-        <a:srgbClr val="33CCCC"/>
+        <a:srgbClr val="001F3F"/>
       </a:accent4>
       <a:accent5>
-        <a:srgbClr val="9966FF"/>
+        <a:srgbClr val="BFBFBF"/>
       </a:accent5>
       <a:accent6>
-        <a:srgbClr val="0FDEBD"/>
+        <a:srgbClr val="E3F8FF"/>
       </a:accent6>
       <a:hlink>
-        <a:srgbClr val="CC66FF"/>
+        <a:srgbClr val="53AFFF"/>
       </a:hlink>
       <a:folHlink>
-        <a:srgbClr val="CC66FF"/>
+        <a:srgbClr val="53AFFF"/>
       </a:folHlink>
     </a:clrScheme>
     <a:fontScheme name="Office">

</xml_diff>